<commit_message>
Separate Name and Title into individual boxes in org chart
Modified org_chart_renderer_final.py to render Name and Title in
separate boxes to match the PDF reference image format.

Changes:
- Added _should_split_box() to detect boxes with title+name content
- Added _split_box_content() to separate title lines from name lines
- Added _add_split_boxes() to create two vertically stacked boxes
- Refactored add_box() to use _add_single_box() for non-split boxes
- Title boxes retain original style/color, name boxes use white background
- Heights are proportionally distributed based on line count

This matches the original reference format where each person has
two separate boxes instead of a single combined box.
</commit_message>
<xml_diff>
--- a/outputs/Makkah_Projects_FINAL.pptx
+++ b/outputs/Makkah_Projects_FINAL.pptx
@@ -3169,7 +3169,7 @@
         <p:spPr>
           <a:xfrm>
             <a:off x="5041392" y="712622"/>
-            <a:ext cx="1890522" cy="427573"/>
+            <a:ext cx="1890522" cy="285048"/>
           </a:xfrm>
           <a:prstGeom prst="rect">
             <a:avLst/>
@@ -3244,28 +3244,6 @@
               <a:t>Project Management Division</a:t>
             </a:r>
           </a:p>
-          <a:p>
-            <a:pPr algn="ctr">
-              <a:lnSpc>
-                <a:spcPct val="90000"/>
-              </a:lnSpc>
-              <a:spcBef>
-                <a:spcPts val="0"/>
-              </a:spcBef>
-              <a:spcAft>
-                <a:spcPts val="0"/>
-              </a:spcAft>
-            </a:pPr>
-            <a:r>
-              <a:rPr sz="900">
-                <a:solidFill>
-                  <a:srgbClr val="000000"/>
-                </a:solidFill>
-                <a:latin typeface="Arial"/>
-              </a:rPr>
-              <a:t>Ahmed Taha</a:t>
-            </a:r>
-          </a:p>
         </p:txBody>
       </p:sp>
       <p:sp>
@@ -3276,8 +3254,8 @@
         </p:nvSpPr>
         <p:spPr>
           <a:xfrm>
-            <a:off x="3781044" y="1425244"/>
-            <a:ext cx="1260348" cy="285048"/>
+            <a:off x="5041392" y="997671"/>
+            <a:ext cx="1890522" cy="142524"/>
           </a:xfrm>
           <a:prstGeom prst="rect">
             <a:avLst/>
@@ -3321,35 +3299,13 @@
               </a:spcAft>
             </a:pPr>
             <a:r>
-              <a:rPr sz="700">
-                <a:solidFill>
-                  <a:srgbClr val="000000"/>
-                </a:solidFill>
-                <a:latin typeface="Arial"/>
-              </a:rPr>
-              <a:t>Admin &amp; Support Function</a:t>
-            </a:r>
-          </a:p>
-          <a:p>
-            <a:pPr algn="ctr">
-              <a:lnSpc>
-                <a:spcPct val="90000"/>
-              </a:lnSpc>
-              <a:spcBef>
-                <a:spcPts val="0"/>
-              </a:spcBef>
-              <a:spcAft>
-                <a:spcPts val="0"/>
-              </a:spcAft>
-            </a:pPr>
-            <a:r>
-              <a:rPr sz="700">
-                <a:solidFill>
-                  <a:srgbClr val="000000"/>
-                </a:solidFill>
-                <a:latin typeface="Arial"/>
-              </a:rPr>
-              <a:t>Saheedh Chockli</a:t>
+              <a:rPr sz="900">
+                <a:solidFill>
+                  <a:srgbClr val="000000"/>
+                </a:solidFill>
+                <a:latin typeface="Arial"/>
+              </a:rPr>
+              <a:t>Ahmed Taha</a:t>
             </a:r>
           </a:p>
         </p:txBody>
@@ -3362,8 +3318,8 @@
         </p:nvSpPr>
         <p:spPr>
           <a:xfrm>
-            <a:off x="5671566" y="1425244"/>
-            <a:ext cx="1512417" cy="427573"/>
+            <a:off x="3781044" y="1425244"/>
+            <a:ext cx="1260348" cy="285048"/>
           </a:xfrm>
           <a:prstGeom prst="rect">
             <a:avLst/>
@@ -3407,6 +3363,92 @@
               </a:spcAft>
             </a:pPr>
             <a:r>
+              <a:rPr sz="700">
+                <a:solidFill>
+                  <a:srgbClr val="000000"/>
+                </a:solidFill>
+                <a:latin typeface="Arial"/>
+              </a:rPr>
+              <a:t>Admin &amp; Support Function</a:t>
+            </a:r>
+          </a:p>
+          <a:p>
+            <a:pPr algn="ctr">
+              <a:lnSpc>
+                <a:spcPct val="90000"/>
+              </a:lnSpc>
+              <a:spcBef>
+                <a:spcPts val="0"/>
+              </a:spcBef>
+              <a:spcAft>
+                <a:spcPts val="0"/>
+              </a:spcAft>
+            </a:pPr>
+            <a:r>
+              <a:rPr sz="700">
+                <a:solidFill>
+                  <a:srgbClr val="000000"/>
+                </a:solidFill>
+                <a:latin typeface="Arial"/>
+              </a:rPr>
+              <a:t>Saheedh Chockli</a:t>
+            </a:r>
+          </a:p>
+        </p:txBody>
+      </p:sp>
+      <p:sp>
+        <p:nvSpPr>
+          <p:cNvPr id="7" name="Rectangle 6"/>
+          <p:cNvSpPr/>
+          <p:nvPr/>
+        </p:nvSpPr>
+        <p:spPr>
+          <a:xfrm>
+            <a:off x="5671566" y="1425244"/>
+            <a:ext cx="1512417" cy="427573"/>
+          </a:xfrm>
+          <a:prstGeom prst="rect">
+            <a:avLst/>
+          </a:prstGeom>
+          <a:solidFill>
+            <a:srgbClr val="FFFFFF"/>
+          </a:solidFill>
+          <a:ln w="6350">
+            <a:solidFill>
+              <a:srgbClr val="000000"/>
+            </a:solidFill>
+          </a:ln>
+        </p:spPr>
+        <p:style>
+          <a:lnRef idx="1">
+            <a:schemeClr val="accent1"/>
+          </a:lnRef>
+          <a:fillRef idx="3">
+            <a:schemeClr val="accent1"/>
+          </a:fillRef>
+          <a:effectRef idx="2">
+            <a:schemeClr val="accent1"/>
+          </a:effectRef>
+          <a:fontRef idx="minor">
+            <a:schemeClr val="lt1"/>
+          </a:fontRef>
+        </p:style>
+        <p:txBody>
+          <a:bodyPr rtlCol="0" anchor="ctr" wrap="square" bIns="6350" tIns="6350" lIns="12700" rIns="12700"/>
+          <a:lstStyle/>
+          <a:p>
+            <a:pPr algn="ctr">
+              <a:lnSpc>
+                <a:spcPct val="90000"/>
+              </a:lnSpc>
+              <a:spcBef>
+                <a:spcPts val="0"/>
+              </a:spcBef>
+              <a:spcAft>
+                <a:spcPts val="0"/>
+              </a:spcAft>
+            </a:pPr>
+            <a:r>
               <a:rPr sz="800">
                 <a:solidFill>
                   <a:srgbClr val="000000"/>
@@ -3464,7 +3506,7 @@
       </p:sp>
       <p:sp>
         <p:nvSpPr>
-          <p:cNvPr id="7" name="Rectangle 6"/>
+          <p:cNvPr id="8" name="Rectangle 7"/>
           <p:cNvSpPr/>
           <p:nvPr/>
         </p:nvSpPr>
@@ -3572,7 +3614,7 @@
       </p:sp>
       <p:sp>
         <p:nvSpPr>
-          <p:cNvPr id="8" name="Rectangle 7"/>
+          <p:cNvPr id="9" name="Rectangle 8"/>
           <p:cNvSpPr/>
           <p:nvPr/>
         </p:nvSpPr>
@@ -3658,7 +3700,7 @@
       </p:sp>
       <p:sp>
         <p:nvSpPr>
-          <p:cNvPr id="9" name="Rectangle 8"/>
+          <p:cNvPr id="10" name="Rectangle 9"/>
           <p:cNvSpPr/>
           <p:nvPr/>
         </p:nvSpPr>
@@ -3744,7 +3786,7 @@
       </p:sp>
       <p:sp>
         <p:nvSpPr>
-          <p:cNvPr id="10" name="Rectangle 9"/>
+          <p:cNvPr id="11" name="Rectangle 10"/>
           <p:cNvSpPr/>
           <p:nvPr/>
         </p:nvSpPr>
@@ -3830,7 +3872,7 @@
       </p:sp>
       <p:sp>
         <p:nvSpPr>
-          <p:cNvPr id="11" name="Rectangle 10"/>
+          <p:cNvPr id="12" name="Rectangle 11"/>
           <p:cNvSpPr/>
           <p:nvPr/>
         </p:nvSpPr>
@@ -3894,14 +3936,14 @@
       </p:sp>
       <p:sp>
         <p:nvSpPr>
-          <p:cNvPr id="12" name="Rectangle 11"/>
+          <p:cNvPr id="13" name="Rectangle 12"/>
           <p:cNvSpPr/>
           <p:nvPr/>
         </p:nvSpPr>
         <p:spPr>
           <a:xfrm>
             <a:off x="630174" y="2993014"/>
-            <a:ext cx="1260348" cy="285048"/>
+            <a:ext cx="1260348" cy="142524"/>
           </a:xfrm>
           <a:prstGeom prst="rect">
             <a:avLst/>
@@ -3954,40 +3996,18 @@
               <a:t>LC (SME*)</a:t>
             </a:r>
           </a:p>
-          <a:p>
-            <a:pPr algn="ctr">
-              <a:lnSpc>
-                <a:spcPct val="90000"/>
-              </a:lnSpc>
-              <a:spcBef>
-                <a:spcPts val="0"/>
-              </a:spcBef>
-              <a:spcAft>
-                <a:spcPts val="0"/>
-              </a:spcAft>
-            </a:pPr>
-            <a:r>
-              <a:rPr sz="800">
-                <a:solidFill>
-                  <a:srgbClr val="000000"/>
-                </a:solidFill>
-                <a:latin typeface="Arial"/>
-              </a:rPr>
-              <a:t>Sameh El Wazeer</a:t>
-            </a:r>
-          </a:p>
-        </p:txBody>
-      </p:sp>
-      <p:sp>
-        <p:nvSpPr>
-          <p:cNvPr id="13" name="Rectangle 12"/>
+        </p:txBody>
+      </p:sp>
+      <p:sp>
+        <p:nvSpPr>
+          <p:cNvPr id="14" name="Rectangle 13"/>
           <p:cNvSpPr/>
           <p:nvPr/>
         </p:nvSpPr>
         <p:spPr>
           <a:xfrm>
-            <a:off x="378104" y="3563112"/>
-            <a:ext cx="882243" cy="256544"/>
+            <a:off x="630174" y="3135538"/>
+            <a:ext cx="1260348" cy="142524"/>
           </a:xfrm>
           <a:prstGeom prst="rect">
             <a:avLst/>
@@ -4031,48 +4051,26 @@
               </a:spcAft>
             </a:pPr>
             <a:r>
-              <a:rPr sz="700">
-                <a:solidFill>
-                  <a:srgbClr val="000000"/>
-                </a:solidFill>
-                <a:latin typeface="Arial"/>
-              </a:rPr>
-              <a:t>Technical Engineer</a:t>
-            </a:r>
-          </a:p>
-          <a:p>
-            <a:pPr algn="ctr">
-              <a:lnSpc>
-                <a:spcPct val="90000"/>
-              </a:lnSpc>
-              <a:spcBef>
-                <a:spcPts val="0"/>
-              </a:spcBef>
-              <a:spcAft>
-                <a:spcPts val="0"/>
-              </a:spcAft>
-            </a:pPr>
-            <a:r>
-              <a:rPr sz="700">
-                <a:solidFill>
-                  <a:srgbClr val="000000"/>
-                </a:solidFill>
-                <a:latin typeface="Arial"/>
-              </a:rPr>
-              <a:t>Bekshan Basheer</a:t>
-            </a:r>
-          </a:p>
-        </p:txBody>
-      </p:sp>
-      <p:sp>
-        <p:nvSpPr>
-          <p:cNvPr id="14" name="Rectangle 13"/>
+              <a:rPr sz="800">
+                <a:solidFill>
+                  <a:srgbClr val="000000"/>
+                </a:solidFill>
+                <a:latin typeface="Arial"/>
+              </a:rPr>
+              <a:t>Sameh El Wazeer</a:t>
+            </a:r>
+          </a:p>
+        </p:txBody>
+      </p:sp>
+      <p:sp>
+        <p:nvSpPr>
+          <p:cNvPr id="15" name="Rectangle 14"/>
           <p:cNvSpPr/>
           <p:nvPr/>
         </p:nvSpPr>
         <p:spPr>
           <a:xfrm>
-            <a:off x="1386382" y="3563112"/>
+            <a:off x="378104" y="3563112"/>
             <a:ext cx="882243" cy="256544"/>
           </a:xfrm>
           <a:prstGeom prst="rect">
@@ -4145,20 +4143,20 @@
                 </a:solidFill>
                 <a:latin typeface="Arial"/>
               </a:rPr>
-              <a:t>Sayed Qadri</a:t>
-            </a:r>
-          </a:p>
-        </p:txBody>
-      </p:sp>
-      <p:sp>
-        <p:nvSpPr>
-          <p:cNvPr id="15" name="Rectangle 14"/>
+              <a:t>Bekshan Basheer</a:t>
+            </a:r>
+          </a:p>
+        </p:txBody>
+      </p:sp>
+      <p:sp>
+        <p:nvSpPr>
+          <p:cNvPr id="16" name="Rectangle 15"/>
           <p:cNvSpPr/>
           <p:nvPr/>
         </p:nvSpPr>
         <p:spPr>
           <a:xfrm>
-            <a:off x="378104" y="3990685"/>
+            <a:off x="1386382" y="3563112"/>
             <a:ext cx="882243" cy="256544"/>
           </a:xfrm>
           <a:prstGeom prst="rect">
@@ -4203,70 +4201,48 @@
               </a:spcAft>
             </a:pPr>
             <a:r>
-              <a:rPr sz="600">
-                <a:solidFill>
-                  <a:srgbClr val="000000"/>
-                </a:solidFill>
-                <a:latin typeface="Arial"/>
-              </a:rPr>
-              <a:t>Senior Draftman (site</a:t>
-            </a:r>
-          </a:p>
-          <a:p>
-            <a:pPr algn="ctr">
-              <a:lnSpc>
-                <a:spcPct val="90000"/>
-              </a:lnSpc>
-              <a:spcBef>
-                <a:spcPts val="0"/>
-              </a:spcBef>
-              <a:spcAft>
-                <a:spcPts val="0"/>
-              </a:spcAft>
-            </a:pPr>
-            <a:r>
-              <a:rPr sz="600">
-                <a:solidFill>
-                  <a:srgbClr val="000000"/>
-                </a:solidFill>
-                <a:latin typeface="Arial"/>
-              </a:rPr>
-              <a:t>support)</a:t>
-            </a:r>
-          </a:p>
-          <a:p>
-            <a:pPr algn="ctr">
-              <a:lnSpc>
-                <a:spcPct val="90000"/>
-              </a:lnSpc>
-              <a:spcBef>
-                <a:spcPts val="0"/>
-              </a:spcBef>
-              <a:spcAft>
-                <a:spcPts val="0"/>
-              </a:spcAft>
-            </a:pPr>
-            <a:r>
               <a:rPr sz="700">
                 <a:solidFill>
                   <a:srgbClr val="000000"/>
                 </a:solidFill>
                 <a:latin typeface="Arial"/>
               </a:rPr>
-              <a:t>Abdul Latheef</a:t>
-            </a:r>
-          </a:p>
-        </p:txBody>
-      </p:sp>
-      <p:sp>
-        <p:nvSpPr>
-          <p:cNvPr id="16" name="Rectangle 15"/>
+              <a:t>Technical Engineer</a:t>
+            </a:r>
+          </a:p>
+          <a:p>
+            <a:pPr algn="ctr">
+              <a:lnSpc>
+                <a:spcPct val="90000"/>
+              </a:lnSpc>
+              <a:spcBef>
+                <a:spcPts val="0"/>
+              </a:spcBef>
+              <a:spcAft>
+                <a:spcPts val="0"/>
+              </a:spcAft>
+            </a:pPr>
+            <a:r>
+              <a:rPr sz="700">
+                <a:solidFill>
+                  <a:srgbClr val="000000"/>
+                </a:solidFill>
+                <a:latin typeface="Arial"/>
+              </a:rPr>
+              <a:t>Sayed Qadri</a:t>
+            </a:r>
+          </a:p>
+        </p:txBody>
+      </p:sp>
+      <p:sp>
+        <p:nvSpPr>
+          <p:cNvPr id="17" name="Rectangle 16"/>
           <p:cNvSpPr/>
           <p:nvPr/>
         </p:nvSpPr>
         <p:spPr>
           <a:xfrm>
-            <a:off x="1386382" y="3990685"/>
+            <a:off x="378104" y="3990685"/>
             <a:ext cx="882243" cy="256544"/>
           </a:xfrm>
           <a:prstGeom prst="rect">
@@ -4311,49 +4287,71 @@
               </a:spcAft>
             </a:pPr>
             <a:r>
+              <a:rPr sz="600">
+                <a:solidFill>
+                  <a:srgbClr val="000000"/>
+                </a:solidFill>
+                <a:latin typeface="Arial"/>
+              </a:rPr>
+              <a:t>Senior Draftman (site</a:t>
+            </a:r>
+          </a:p>
+          <a:p>
+            <a:pPr algn="ctr">
+              <a:lnSpc>
+                <a:spcPct val="90000"/>
+              </a:lnSpc>
+              <a:spcBef>
+                <a:spcPts val="0"/>
+              </a:spcBef>
+              <a:spcAft>
+                <a:spcPts val="0"/>
+              </a:spcAft>
+            </a:pPr>
+            <a:r>
+              <a:rPr sz="600">
+                <a:solidFill>
+                  <a:srgbClr val="000000"/>
+                </a:solidFill>
+                <a:latin typeface="Arial"/>
+              </a:rPr>
+              <a:t>support)</a:t>
+            </a:r>
+          </a:p>
+          <a:p>
+            <a:pPr algn="ctr">
+              <a:lnSpc>
+                <a:spcPct val="90000"/>
+              </a:lnSpc>
+              <a:spcBef>
+                <a:spcPts val="0"/>
+              </a:spcBef>
+              <a:spcAft>
+                <a:spcPts val="0"/>
+              </a:spcAft>
+            </a:pPr>
+            <a:r>
               <a:rPr sz="700">
                 <a:solidFill>
                   <a:srgbClr val="000000"/>
                 </a:solidFill>
                 <a:latin typeface="Arial"/>
               </a:rPr>
-              <a:t>Draftman</a:t>
-            </a:r>
-          </a:p>
-          <a:p>
-            <a:pPr algn="ctr">
-              <a:lnSpc>
-                <a:spcPct val="90000"/>
-              </a:lnSpc>
-              <a:spcBef>
-                <a:spcPts val="0"/>
-              </a:spcBef>
-              <a:spcAft>
-                <a:spcPts val="0"/>
-              </a:spcAft>
-            </a:pPr>
-            <a:r>
-              <a:rPr sz="600">
-                <a:solidFill>
-                  <a:srgbClr val="000000"/>
-                </a:solidFill>
-                <a:latin typeface="Arial"/>
-              </a:rPr>
-              <a:t>Mohamed Fawzy Attiya</a:t>
-            </a:r>
-          </a:p>
-        </p:txBody>
-      </p:sp>
-      <p:sp>
-        <p:nvSpPr>
-          <p:cNvPr id="17" name="Rectangle 16"/>
+              <a:t>Abdul Latheef</a:t>
+            </a:r>
+          </a:p>
+        </p:txBody>
+      </p:sp>
+      <p:sp>
+        <p:nvSpPr>
+          <p:cNvPr id="18" name="Rectangle 17"/>
           <p:cNvSpPr/>
           <p:nvPr/>
         </p:nvSpPr>
         <p:spPr>
           <a:xfrm>
-            <a:off x="378104" y="4418258"/>
-            <a:ext cx="630174" cy="213786"/>
+            <a:off x="1386382" y="3990685"/>
+            <a:ext cx="882243" cy="256544"/>
           </a:xfrm>
           <a:prstGeom prst="rect">
             <a:avLst/>
@@ -4425,20 +4423,20 @@
                 </a:solidFill>
                 <a:latin typeface="Arial"/>
               </a:rPr>
-              <a:t>Aumaih Yahya</a:t>
-            </a:r>
-          </a:p>
-        </p:txBody>
-      </p:sp>
-      <p:sp>
-        <p:nvSpPr>
-          <p:cNvPr id="18" name="Rectangle 17"/>
+              <a:t>Mohamed Fawzy Attiya</a:t>
+            </a:r>
+          </a:p>
+        </p:txBody>
+      </p:sp>
+      <p:sp>
+        <p:nvSpPr>
+          <p:cNvPr id="19" name="Rectangle 18"/>
           <p:cNvSpPr/>
           <p:nvPr/>
         </p:nvSpPr>
         <p:spPr>
           <a:xfrm>
-            <a:off x="1134313" y="4418258"/>
+            <a:off x="378104" y="4418258"/>
             <a:ext cx="630174" cy="213786"/>
           </a:xfrm>
           <a:prstGeom prst="rect">
@@ -4511,20 +4509,20 @@
                 </a:solidFill>
                 <a:latin typeface="Arial"/>
               </a:rPr>
-              <a:t>Sayed A. Safi</a:t>
-            </a:r>
-          </a:p>
-        </p:txBody>
-      </p:sp>
-      <p:sp>
-        <p:nvSpPr>
-          <p:cNvPr id="19" name="Rectangle 18"/>
+              <a:t>Aumaih Yahya</a:t>
+            </a:r>
+          </a:p>
+        </p:txBody>
+      </p:sp>
+      <p:sp>
+        <p:nvSpPr>
+          <p:cNvPr id="20" name="Rectangle 19"/>
           <p:cNvSpPr/>
           <p:nvPr/>
         </p:nvSpPr>
         <p:spPr>
           <a:xfrm>
-            <a:off x="1890522" y="4418258"/>
+            <a:off x="1134313" y="4418258"/>
             <a:ext cx="630174" cy="213786"/>
           </a:xfrm>
           <a:prstGeom prst="rect">
@@ -4597,20 +4595,20 @@
                 </a:solidFill>
                 <a:latin typeface="Arial"/>
               </a:rPr>
-              <a:t>Ameen Mohamed</a:t>
-            </a:r>
-          </a:p>
-        </p:txBody>
-      </p:sp>
-      <p:sp>
-        <p:nvSpPr>
-          <p:cNvPr id="20" name="Rectangle 19"/>
+              <a:t>Sayed A. Safi</a:t>
+            </a:r>
+          </a:p>
+        </p:txBody>
+      </p:sp>
+      <p:sp>
+        <p:nvSpPr>
+          <p:cNvPr id="21" name="Rectangle 20"/>
           <p:cNvSpPr/>
           <p:nvPr/>
         </p:nvSpPr>
         <p:spPr>
           <a:xfrm>
-            <a:off x="378104" y="4774570"/>
+            <a:off x="1890522" y="4418258"/>
             <a:ext cx="630174" cy="213786"/>
           </a:xfrm>
           <a:prstGeom prst="rect">
@@ -4683,42 +4681,20 @@
                 </a:solidFill>
                 <a:latin typeface="Arial"/>
               </a:rPr>
-              <a:t>Mohamed Abdul</a:t>
-            </a:r>
-          </a:p>
-          <a:p>
-            <a:pPr algn="ctr">
-              <a:lnSpc>
-                <a:spcPct val="90000"/>
-              </a:lnSpc>
-              <a:spcBef>
-                <a:spcPts val="0"/>
-              </a:spcBef>
-              <a:spcAft>
-                <a:spcPts val="0"/>
-              </a:spcAft>
-            </a:pPr>
-            <a:r>
-              <a:rPr sz="600">
-                <a:solidFill>
-                  <a:srgbClr val="000000"/>
-                </a:solidFill>
-                <a:latin typeface="Arial"/>
-              </a:rPr>
-              <a:t>Rahman</a:t>
-            </a:r>
-          </a:p>
-        </p:txBody>
-      </p:sp>
-      <p:sp>
-        <p:nvSpPr>
-          <p:cNvPr id="21" name="Rectangle 20"/>
+              <a:t>Ameen Mohamed</a:t>
+            </a:r>
+          </a:p>
+        </p:txBody>
+      </p:sp>
+      <p:sp>
+        <p:nvSpPr>
+          <p:cNvPr id="22" name="Rectangle 21"/>
           <p:cNvSpPr/>
           <p:nvPr/>
         </p:nvSpPr>
         <p:spPr>
           <a:xfrm>
-            <a:off x="1134313" y="4774570"/>
+            <a:off x="378104" y="4774570"/>
             <a:ext cx="630174" cy="213786"/>
           </a:xfrm>
           <a:prstGeom prst="rect">
@@ -4791,20 +4767,42 @@
                 </a:solidFill>
                 <a:latin typeface="Arial"/>
               </a:rPr>
-              <a:t>Sayed Shahzad</a:t>
-            </a:r>
-          </a:p>
-        </p:txBody>
-      </p:sp>
-      <p:sp>
-        <p:nvSpPr>
-          <p:cNvPr id="22" name="Rectangle 21"/>
+              <a:t>Mohamed Abdul</a:t>
+            </a:r>
+          </a:p>
+          <a:p>
+            <a:pPr algn="ctr">
+              <a:lnSpc>
+                <a:spcPct val="90000"/>
+              </a:lnSpc>
+              <a:spcBef>
+                <a:spcPts val="0"/>
+              </a:spcBef>
+              <a:spcAft>
+                <a:spcPts val="0"/>
+              </a:spcAft>
+            </a:pPr>
+            <a:r>
+              <a:rPr sz="600">
+                <a:solidFill>
+                  <a:srgbClr val="000000"/>
+                </a:solidFill>
+                <a:latin typeface="Arial"/>
+              </a:rPr>
+              <a:t>Rahman</a:t>
+            </a:r>
+          </a:p>
+        </p:txBody>
+      </p:sp>
+      <p:sp>
+        <p:nvSpPr>
+          <p:cNvPr id="23" name="Rectangle 22"/>
           <p:cNvSpPr/>
           <p:nvPr/>
         </p:nvSpPr>
         <p:spPr>
           <a:xfrm>
-            <a:off x="1890522" y="4774570"/>
+            <a:off x="1134313" y="4774570"/>
             <a:ext cx="630174" cy="213786"/>
           </a:xfrm>
           <a:prstGeom prst="rect">
@@ -4877,20 +4875,20 @@
                 </a:solidFill>
                 <a:latin typeface="Arial"/>
               </a:rPr>
-              <a:t>Mohamed Burhan</a:t>
-            </a:r>
-          </a:p>
-        </p:txBody>
-      </p:sp>
-      <p:sp>
-        <p:nvSpPr>
-          <p:cNvPr id="23" name="Rectangle 22"/>
+              <a:t>Sayed Shahzad</a:t>
+            </a:r>
+          </a:p>
+        </p:txBody>
+      </p:sp>
+      <p:sp>
+        <p:nvSpPr>
+          <p:cNvPr id="24" name="Rectangle 23"/>
           <p:cNvSpPr/>
           <p:nvPr/>
         </p:nvSpPr>
         <p:spPr>
           <a:xfrm>
-            <a:off x="2646730" y="4774570"/>
+            <a:off x="1890522" y="4774570"/>
             <a:ext cx="630174" cy="213786"/>
           </a:xfrm>
           <a:prstGeom prst="rect">
@@ -4963,21 +4961,21 @@
                 </a:solidFill>
                 <a:latin typeface="Arial"/>
               </a:rPr>
-              <a:t>Ali Kamel</a:t>
-            </a:r>
-          </a:p>
-        </p:txBody>
-      </p:sp>
-      <p:sp>
-        <p:nvSpPr>
-          <p:cNvPr id="24" name="Rectangle 23"/>
+              <a:t>Mohamed Burhan</a:t>
+            </a:r>
+          </a:p>
+        </p:txBody>
+      </p:sp>
+      <p:sp>
+        <p:nvSpPr>
+          <p:cNvPr id="25" name="Rectangle 24"/>
           <p:cNvSpPr/>
           <p:nvPr/>
         </p:nvSpPr>
         <p:spPr>
           <a:xfrm>
-            <a:off x="3402939" y="4774570"/>
-            <a:ext cx="504139" cy="213786"/>
+            <a:off x="2646730" y="4774570"/>
+            <a:ext cx="630174" cy="213786"/>
           </a:xfrm>
           <a:prstGeom prst="rect">
             <a:avLst/>
@@ -5027,81 +5025,97 @@
                 </a:solidFill>
                 <a:latin typeface="Arial"/>
               </a:rPr>
+              <a:t>Draftman</a:t>
+            </a:r>
+          </a:p>
+          <a:p>
+            <a:pPr algn="ctr">
+              <a:lnSpc>
+                <a:spcPct val="90000"/>
+              </a:lnSpc>
+              <a:spcBef>
+                <a:spcPts val="0"/>
+              </a:spcBef>
+              <a:spcAft>
+                <a:spcPts val="0"/>
+              </a:spcAft>
+            </a:pPr>
+            <a:r>
+              <a:rPr sz="600">
+                <a:solidFill>
+                  <a:srgbClr val="000000"/>
+                </a:solidFill>
+                <a:latin typeface="Arial"/>
+              </a:rPr>
+              <a:t>Ali Kamel</a:t>
+            </a:r>
+          </a:p>
+        </p:txBody>
+      </p:sp>
+      <p:sp>
+        <p:nvSpPr>
+          <p:cNvPr id="26" name="Rectangle 25"/>
+          <p:cNvSpPr/>
+          <p:nvPr/>
+        </p:nvSpPr>
+        <p:spPr>
+          <a:xfrm>
+            <a:off x="3402939" y="4774570"/>
+            <a:ext cx="504139" cy="213786"/>
+          </a:xfrm>
+          <a:prstGeom prst="rect">
+            <a:avLst/>
+          </a:prstGeom>
+          <a:solidFill>
+            <a:srgbClr val="FFFFFF"/>
+          </a:solidFill>
+          <a:ln w="6350">
+            <a:solidFill>
+              <a:srgbClr val="000000"/>
+            </a:solidFill>
+          </a:ln>
+        </p:spPr>
+        <p:style>
+          <a:lnRef idx="1">
+            <a:schemeClr val="accent1"/>
+          </a:lnRef>
+          <a:fillRef idx="3">
+            <a:schemeClr val="accent1"/>
+          </a:fillRef>
+          <a:effectRef idx="2">
+            <a:schemeClr val="accent1"/>
+          </a:effectRef>
+          <a:fontRef idx="minor">
+            <a:schemeClr val="lt1"/>
+          </a:fontRef>
+        </p:style>
+        <p:txBody>
+          <a:bodyPr rtlCol="0" anchor="ctr" wrap="square" bIns="6350" tIns="6350" lIns="12700" rIns="12700"/>
+          <a:lstStyle/>
+          <a:p>
+            <a:pPr algn="ctr">
+              <a:lnSpc>
+                <a:spcPct val="90000"/>
+              </a:lnSpc>
+              <a:spcBef>
+                <a:spcPts val="0"/>
+              </a:spcBef>
+              <a:spcAft>
+                <a:spcPts val="0"/>
+              </a:spcAft>
+            </a:pPr>
+            <a:r>
+              <a:rPr sz="700">
+                <a:solidFill>
+                  <a:srgbClr val="000000"/>
+                </a:solidFill>
+                <a:latin typeface="Arial"/>
+              </a:rPr>
               <a:t>Driver</a:t>
             </a:r>
           </a:p>
         </p:txBody>
       </p:sp>
-      <p:cxnSp>
-        <p:nvCxnSpPr>
-          <p:cNvPr id="25" name="Connector 24"/>
-          <p:cNvCxnSpPr/>
-          <p:nvPr/>
-        </p:nvCxnSpPr>
-        <p:spPr>
-          <a:xfrm>
-            <a:off x="1260348" y="3278063"/>
-            <a:ext cx="0" cy="142524"/>
-          </a:xfrm>
-          <a:prstGeom prst="line">
-            <a:avLst/>
-          </a:prstGeom>
-          <a:ln w="6350">
-            <a:solidFill>
-              <a:srgbClr val="000000"/>
-            </a:solidFill>
-          </a:ln>
-        </p:spPr>
-        <p:style>
-          <a:lnRef idx="2">
-            <a:schemeClr val="accent1"/>
-          </a:lnRef>
-          <a:fillRef idx="0">
-            <a:schemeClr val="accent1"/>
-          </a:fillRef>
-          <a:effectRef idx="1">
-            <a:schemeClr val="accent1"/>
-          </a:effectRef>
-          <a:fontRef idx="minor">
-            <a:schemeClr val="tx1"/>
-          </a:fontRef>
-        </p:style>
-      </p:cxnSp>
-      <p:cxnSp>
-        <p:nvCxnSpPr>
-          <p:cNvPr id="26" name="Connector 25"/>
-          <p:cNvCxnSpPr/>
-          <p:nvPr/>
-        </p:nvCxnSpPr>
-        <p:spPr>
-          <a:xfrm>
-            <a:off x="693191" y="3420587"/>
-            <a:ext cx="2961818" cy="0"/>
-          </a:xfrm>
-          <a:prstGeom prst="line">
-            <a:avLst/>
-          </a:prstGeom>
-          <a:ln w="6350">
-            <a:solidFill>
-              <a:srgbClr val="000000"/>
-            </a:solidFill>
-          </a:ln>
-        </p:spPr>
-        <p:style>
-          <a:lnRef idx="2">
-            <a:schemeClr val="accent1"/>
-          </a:lnRef>
-          <a:fillRef idx="0">
-            <a:schemeClr val="accent1"/>
-          </a:fillRef>
-          <a:effectRef idx="1">
-            <a:schemeClr val="accent1"/>
-          </a:effectRef>
-          <a:fontRef idx="minor">
-            <a:schemeClr val="tx1"/>
-          </a:fontRef>
-        </p:style>
-      </p:cxnSp>
       <p:cxnSp>
         <p:nvCxnSpPr>
           <p:cNvPr id="27" name="Connector 26"/>
@@ -5110,8 +5124,8 @@
         </p:nvCxnSpPr>
         <p:spPr>
           <a:xfrm>
-            <a:off x="819226" y="3420587"/>
-            <a:ext cx="0" cy="142525"/>
+            <a:off x="1260348" y="3278063"/>
+            <a:ext cx="0" cy="142524"/>
           </a:xfrm>
           <a:prstGeom prst="line">
             <a:avLst/>
@@ -5145,8 +5159,8 @@
         </p:nvCxnSpPr>
         <p:spPr>
           <a:xfrm>
-            <a:off x="1827504" y="3420587"/>
-            <a:ext cx="0" cy="142525"/>
+            <a:off x="693191" y="3420587"/>
+            <a:ext cx="2961818" cy="0"/>
           </a:xfrm>
           <a:prstGeom prst="line">
             <a:avLst/>
@@ -5181,7 +5195,7 @@
         <p:spPr>
           <a:xfrm>
             <a:off x="819226" y="3420587"/>
-            <a:ext cx="0" cy="570098"/>
+            <a:ext cx="0" cy="142525"/>
           </a:xfrm>
           <a:prstGeom prst="line">
             <a:avLst/>
@@ -5216,7 +5230,7 @@
         <p:spPr>
           <a:xfrm>
             <a:off x="1827504" y="3420587"/>
-            <a:ext cx="0" cy="570098"/>
+            <a:ext cx="0" cy="142525"/>
           </a:xfrm>
           <a:prstGeom prst="line">
             <a:avLst/>
@@ -5250,8 +5264,8 @@
         </p:nvCxnSpPr>
         <p:spPr>
           <a:xfrm>
-            <a:off x="693191" y="3420587"/>
-            <a:ext cx="0" cy="997671"/>
+            <a:off x="819226" y="3420587"/>
+            <a:ext cx="0" cy="570098"/>
           </a:xfrm>
           <a:prstGeom prst="line">
             <a:avLst/>
@@ -5285,8 +5299,8 @@
         </p:nvCxnSpPr>
         <p:spPr>
           <a:xfrm>
-            <a:off x="1449400" y="3420587"/>
-            <a:ext cx="0" cy="997671"/>
+            <a:off x="1827504" y="3420587"/>
+            <a:ext cx="0" cy="570098"/>
           </a:xfrm>
           <a:prstGeom prst="line">
             <a:avLst/>
@@ -5320,7 +5334,7 @@
         </p:nvCxnSpPr>
         <p:spPr>
           <a:xfrm>
-            <a:off x="2205609" y="3420587"/>
+            <a:off x="693191" y="3420587"/>
             <a:ext cx="0" cy="997671"/>
           </a:xfrm>
           <a:prstGeom prst="line">
@@ -5355,8 +5369,8 @@
         </p:nvCxnSpPr>
         <p:spPr>
           <a:xfrm>
-            <a:off x="693191" y="3420587"/>
-            <a:ext cx="0" cy="1353983"/>
+            <a:off x="1449400" y="3420587"/>
+            <a:ext cx="0" cy="997671"/>
           </a:xfrm>
           <a:prstGeom prst="line">
             <a:avLst/>
@@ -5390,8 +5404,8 @@
         </p:nvCxnSpPr>
         <p:spPr>
           <a:xfrm>
-            <a:off x="1449400" y="3420587"/>
-            <a:ext cx="0" cy="1353983"/>
+            <a:off x="2205609" y="3420587"/>
+            <a:ext cx="0" cy="997671"/>
           </a:xfrm>
           <a:prstGeom prst="line">
             <a:avLst/>
@@ -5425,7 +5439,7 @@
         </p:nvCxnSpPr>
         <p:spPr>
           <a:xfrm>
-            <a:off x="2205609" y="3420587"/>
+            <a:off x="693191" y="3420587"/>
             <a:ext cx="0" cy="1353983"/>
           </a:xfrm>
           <a:prstGeom prst="line">
@@ -5460,7 +5474,7 @@
         </p:nvCxnSpPr>
         <p:spPr>
           <a:xfrm>
-            <a:off x="2961817" y="3420587"/>
+            <a:off x="1449400" y="3420587"/>
             <a:ext cx="0" cy="1353983"/>
           </a:xfrm>
           <a:prstGeom prst="line">
@@ -5495,6 +5509,76 @@
         </p:nvCxnSpPr>
         <p:spPr>
           <a:xfrm>
+            <a:off x="2205609" y="3420587"/>
+            <a:ext cx="0" cy="1353983"/>
+          </a:xfrm>
+          <a:prstGeom prst="line">
+            <a:avLst/>
+          </a:prstGeom>
+          <a:ln w="6350">
+            <a:solidFill>
+              <a:srgbClr val="000000"/>
+            </a:solidFill>
+          </a:ln>
+        </p:spPr>
+        <p:style>
+          <a:lnRef idx="2">
+            <a:schemeClr val="accent1"/>
+          </a:lnRef>
+          <a:fillRef idx="0">
+            <a:schemeClr val="accent1"/>
+          </a:fillRef>
+          <a:effectRef idx="1">
+            <a:schemeClr val="accent1"/>
+          </a:effectRef>
+          <a:fontRef idx="minor">
+            <a:schemeClr val="tx1"/>
+          </a:fontRef>
+        </p:style>
+      </p:cxnSp>
+      <p:cxnSp>
+        <p:nvCxnSpPr>
+          <p:cNvPr id="39" name="Connector 38"/>
+          <p:cNvCxnSpPr/>
+          <p:nvPr/>
+        </p:nvCxnSpPr>
+        <p:spPr>
+          <a:xfrm>
+            <a:off x="2961817" y="3420587"/>
+            <a:ext cx="0" cy="1353983"/>
+          </a:xfrm>
+          <a:prstGeom prst="line">
+            <a:avLst/>
+          </a:prstGeom>
+          <a:ln w="6350">
+            <a:solidFill>
+              <a:srgbClr val="000000"/>
+            </a:solidFill>
+          </a:ln>
+        </p:spPr>
+        <p:style>
+          <a:lnRef idx="2">
+            <a:schemeClr val="accent1"/>
+          </a:lnRef>
+          <a:fillRef idx="0">
+            <a:schemeClr val="accent1"/>
+          </a:fillRef>
+          <a:effectRef idx="1">
+            <a:schemeClr val="accent1"/>
+          </a:effectRef>
+          <a:fontRef idx="minor">
+            <a:schemeClr val="tx1"/>
+          </a:fontRef>
+        </p:style>
+      </p:cxnSp>
+      <p:cxnSp>
+        <p:nvCxnSpPr>
+          <p:cNvPr id="40" name="Connector 39"/>
+          <p:cNvCxnSpPr/>
+          <p:nvPr/>
+        </p:nvCxnSpPr>
+        <p:spPr>
+          <a:xfrm>
             <a:off x="3655009" y="3420587"/>
             <a:ext cx="0" cy="1353983"/>
           </a:xfrm>
@@ -5524,14 +5608,14 @@
       </p:cxnSp>
       <p:sp>
         <p:nvSpPr>
-          <p:cNvPr id="39" name="Rectangle 38"/>
+          <p:cNvPr id="41" name="Rectangle 40"/>
           <p:cNvSpPr/>
           <p:nvPr/>
         </p:nvSpPr>
         <p:spPr>
           <a:xfrm>
             <a:off x="4033113" y="2993014"/>
-            <a:ext cx="1260348" cy="285048"/>
+            <a:ext cx="1260348" cy="142524"/>
           </a:xfrm>
           <a:prstGeom prst="rect">
             <a:avLst/>
@@ -5584,40 +5668,18 @@
               <a:t>FAS (SME*)</a:t>
             </a:r>
           </a:p>
-          <a:p>
-            <a:pPr algn="ctr">
-              <a:lnSpc>
-                <a:spcPct val="90000"/>
-              </a:lnSpc>
-              <a:spcBef>
-                <a:spcPts val="0"/>
-              </a:spcBef>
-              <a:spcAft>
-                <a:spcPts val="0"/>
-              </a:spcAft>
-            </a:pPr>
-            <a:r>
-              <a:rPr sz="800">
-                <a:solidFill>
-                  <a:srgbClr val="000000"/>
-                </a:solidFill>
-                <a:latin typeface="Arial"/>
-              </a:rPr>
-              <a:t>Hazem Abdullah</a:t>
-            </a:r>
-          </a:p>
-        </p:txBody>
-      </p:sp>
-      <p:sp>
-        <p:nvSpPr>
-          <p:cNvPr id="40" name="Rectangle 39"/>
+        </p:txBody>
+      </p:sp>
+      <p:sp>
+        <p:nvSpPr>
+          <p:cNvPr id="42" name="Rectangle 41"/>
           <p:cNvSpPr/>
           <p:nvPr/>
         </p:nvSpPr>
         <p:spPr>
           <a:xfrm>
-            <a:off x="3402939" y="3563112"/>
-            <a:ext cx="1008278" cy="256544"/>
+            <a:off x="4033113" y="3135538"/>
+            <a:ext cx="1260348" cy="142524"/>
           </a:xfrm>
           <a:prstGeom prst="rect">
             <a:avLst/>
@@ -5661,48 +5723,26 @@
               </a:spcAft>
             </a:pPr>
             <a:r>
-              <a:rPr sz="700">
-                <a:solidFill>
-                  <a:srgbClr val="000000"/>
-                </a:solidFill>
-                <a:latin typeface="Arial"/>
-              </a:rPr>
-              <a:t>Technical Manager</a:t>
-            </a:r>
-          </a:p>
-          <a:p>
-            <a:pPr algn="ctr">
-              <a:lnSpc>
-                <a:spcPct val="90000"/>
-              </a:lnSpc>
-              <a:spcBef>
-                <a:spcPts val="0"/>
-              </a:spcBef>
-              <a:spcAft>
-                <a:spcPts val="0"/>
-              </a:spcAft>
-            </a:pPr>
-            <a:r>
-              <a:rPr sz="700">
-                <a:solidFill>
-                  <a:srgbClr val="000000"/>
-                </a:solidFill>
-                <a:latin typeface="Arial"/>
-              </a:rPr>
-              <a:t>Mustafa Abdul Hadi</a:t>
-            </a:r>
-          </a:p>
-        </p:txBody>
-      </p:sp>
-      <p:sp>
-        <p:nvSpPr>
-          <p:cNvPr id="41" name="Rectangle 40"/>
+              <a:rPr sz="800">
+                <a:solidFill>
+                  <a:srgbClr val="000000"/>
+                </a:solidFill>
+                <a:latin typeface="Arial"/>
+              </a:rPr>
+              <a:t>Hazem Abdullah</a:t>
+            </a:r>
+          </a:p>
+        </p:txBody>
+      </p:sp>
+      <p:sp>
+        <p:nvSpPr>
+          <p:cNvPr id="43" name="Rectangle 42"/>
           <p:cNvSpPr/>
           <p:nvPr/>
         </p:nvSpPr>
         <p:spPr>
           <a:xfrm>
-            <a:off x="4537252" y="3563112"/>
+            <a:off x="3402939" y="3563112"/>
             <a:ext cx="1008278" cy="256544"/>
           </a:xfrm>
           <a:prstGeom prst="rect">
@@ -5753,7 +5793,7 @@
                 </a:solidFill>
                 <a:latin typeface="Arial"/>
               </a:rPr>
-              <a:t>T&amp;C Manager</a:t>
+              <a:t>Technical Manager</a:t>
             </a:r>
           </a:p>
           <a:p>
@@ -5775,21 +5815,21 @@
                 </a:solidFill>
                 <a:latin typeface="Arial"/>
               </a:rPr>
-              <a:t>Ahmed Rabie</a:t>
-            </a:r>
-          </a:p>
-        </p:txBody>
-      </p:sp>
-      <p:sp>
-        <p:nvSpPr>
-          <p:cNvPr id="42" name="Rectangle 41"/>
+              <a:t>Mustafa Abdul Hadi</a:t>
+            </a:r>
+          </a:p>
+        </p:txBody>
+      </p:sp>
+      <p:sp>
+        <p:nvSpPr>
+          <p:cNvPr id="44" name="Rectangle 43"/>
           <p:cNvSpPr/>
           <p:nvPr/>
         </p:nvSpPr>
         <p:spPr>
           <a:xfrm>
-            <a:off x="4159148" y="3990685"/>
-            <a:ext cx="630174" cy="213786"/>
+            <a:off x="4537252" y="3563112"/>
+            <a:ext cx="1008278" cy="256544"/>
           </a:xfrm>
           <a:prstGeom prst="rect">
             <a:avLst/>
@@ -5839,42 +5879,42 @@
                 </a:solidFill>
                 <a:latin typeface="Arial"/>
               </a:rPr>
-              <a:t>T&amp;C Eng</a:t>
-            </a:r>
-          </a:p>
-          <a:p>
-            <a:pPr algn="ctr">
-              <a:lnSpc>
-                <a:spcPct val="90000"/>
-              </a:lnSpc>
-              <a:spcBef>
-                <a:spcPts val="0"/>
-              </a:spcBef>
-              <a:spcAft>
-                <a:spcPts val="0"/>
-              </a:spcAft>
-            </a:pPr>
-            <a:r>
-              <a:rPr sz="700" i="1">
-                <a:solidFill>
-                  <a:srgbClr val="FF0000"/>
-                </a:solidFill>
-                <a:latin typeface="Arial"/>
-              </a:rPr>
-              <a:t>Vacant</a:t>
-            </a:r>
-          </a:p>
-        </p:txBody>
-      </p:sp>
-      <p:sp>
-        <p:nvSpPr>
-          <p:cNvPr id="43" name="Rectangle 42"/>
+              <a:t>T&amp;C Manager</a:t>
+            </a:r>
+          </a:p>
+          <a:p>
+            <a:pPr algn="ctr">
+              <a:lnSpc>
+                <a:spcPct val="90000"/>
+              </a:lnSpc>
+              <a:spcBef>
+                <a:spcPts val="0"/>
+              </a:spcBef>
+              <a:spcAft>
+                <a:spcPts val="0"/>
+              </a:spcAft>
+            </a:pPr>
+            <a:r>
+              <a:rPr sz="700">
+                <a:solidFill>
+                  <a:srgbClr val="000000"/>
+                </a:solidFill>
+                <a:latin typeface="Arial"/>
+              </a:rPr>
+              <a:t>Ahmed Rabie</a:t>
+            </a:r>
+          </a:p>
+        </p:txBody>
+      </p:sp>
+      <p:sp>
+        <p:nvSpPr>
+          <p:cNvPr id="45" name="Rectangle 44"/>
           <p:cNvSpPr/>
           <p:nvPr/>
         </p:nvSpPr>
         <p:spPr>
           <a:xfrm>
-            <a:off x="4915357" y="3990685"/>
+            <a:off x="4159148" y="3990685"/>
             <a:ext cx="630174" cy="213786"/>
           </a:xfrm>
           <a:prstGeom prst="rect">
@@ -5954,13 +5994,13 @@
       </p:sp>
       <p:sp>
         <p:nvSpPr>
-          <p:cNvPr id="44" name="Rectangle 43"/>
+          <p:cNvPr id="46" name="Rectangle 45"/>
           <p:cNvSpPr/>
           <p:nvPr/>
         </p:nvSpPr>
         <p:spPr>
           <a:xfrm>
-            <a:off x="5671566" y="3990685"/>
+            <a:off x="4915357" y="3990685"/>
             <a:ext cx="630174" cy="213786"/>
           </a:xfrm>
           <a:prstGeom prst="rect">
@@ -6040,14 +6080,14 @@
       </p:sp>
       <p:sp>
         <p:nvSpPr>
-          <p:cNvPr id="45" name="Rectangle 44"/>
+          <p:cNvPr id="47" name="Rectangle 46"/>
           <p:cNvSpPr/>
           <p:nvPr/>
         </p:nvSpPr>
         <p:spPr>
           <a:xfrm>
-            <a:off x="3402939" y="4418258"/>
-            <a:ext cx="882243" cy="256544"/>
+            <a:off x="5671566" y="3990685"/>
+            <a:ext cx="630174" cy="213786"/>
           </a:xfrm>
           <a:prstGeom prst="rect">
             <a:avLst/>
@@ -6097,86 +6137,42 @@
                 </a:solidFill>
                 <a:latin typeface="Arial"/>
               </a:rPr>
-              <a:t>Senior Technical</a:t>
-            </a:r>
-          </a:p>
-          <a:p>
-            <a:pPr algn="ctr">
-              <a:lnSpc>
-                <a:spcPct val="90000"/>
-              </a:lnSpc>
-              <a:spcBef>
-                <a:spcPts val="0"/>
-              </a:spcBef>
-              <a:spcAft>
-                <a:spcPts val="0"/>
-              </a:spcAft>
-            </a:pPr>
-            <a:r>
-              <a:rPr sz="700">
-                <a:solidFill>
-                  <a:srgbClr val="000000"/>
-                </a:solidFill>
-                <a:latin typeface="Arial"/>
-              </a:rPr>
-              <a:t>Engineer</a:t>
-            </a:r>
-          </a:p>
-          <a:p>
-            <a:pPr algn="ctr">
-              <a:lnSpc>
-                <a:spcPct val="90000"/>
-              </a:lnSpc>
-              <a:spcBef>
-                <a:spcPts val="0"/>
-              </a:spcBef>
-              <a:spcAft>
-                <a:spcPts val="0"/>
-              </a:spcAft>
-            </a:pPr>
-            <a:r>
-              <a:rPr sz="600">
-                <a:solidFill>
-                  <a:srgbClr val="000000"/>
-                </a:solidFill>
-                <a:latin typeface="Arial"/>
-              </a:rPr>
-              <a:t>Mohamed Abdul</a:t>
-            </a:r>
-          </a:p>
-          <a:p>
-            <a:pPr algn="ctr">
-              <a:lnSpc>
-                <a:spcPct val="90000"/>
-              </a:lnSpc>
-              <a:spcBef>
-                <a:spcPts val="0"/>
-              </a:spcBef>
-              <a:spcAft>
-                <a:spcPts val="0"/>
-              </a:spcAft>
-            </a:pPr>
-            <a:r>
-              <a:rPr sz="600">
-                <a:solidFill>
-                  <a:srgbClr val="000000"/>
-                </a:solidFill>
-                <a:latin typeface="Arial"/>
-              </a:rPr>
-              <a:t>Latheef</a:t>
-            </a:r>
-          </a:p>
-        </p:txBody>
-      </p:sp>
-      <p:sp>
-        <p:nvSpPr>
-          <p:cNvPr id="46" name="Rectangle 45"/>
+              <a:t>T&amp;C Eng</a:t>
+            </a:r>
+          </a:p>
+          <a:p>
+            <a:pPr algn="ctr">
+              <a:lnSpc>
+                <a:spcPct val="90000"/>
+              </a:lnSpc>
+              <a:spcBef>
+                <a:spcPts val="0"/>
+              </a:spcBef>
+              <a:spcAft>
+                <a:spcPts val="0"/>
+              </a:spcAft>
+            </a:pPr>
+            <a:r>
+              <a:rPr sz="700" i="1">
+                <a:solidFill>
+                  <a:srgbClr val="FF0000"/>
+                </a:solidFill>
+                <a:latin typeface="Arial"/>
+              </a:rPr>
+              <a:t>Vacant</a:t>
+            </a:r>
+          </a:p>
+        </p:txBody>
+      </p:sp>
+      <p:sp>
+        <p:nvSpPr>
+          <p:cNvPr id="48" name="Rectangle 47"/>
           <p:cNvSpPr/>
           <p:nvPr/>
         </p:nvSpPr>
         <p:spPr>
           <a:xfrm>
-            <a:off x="4411218" y="4418258"/>
+            <a:off x="3402939" y="4418258"/>
             <a:ext cx="882243" cy="256544"/>
           </a:xfrm>
           <a:prstGeom prst="rect">
@@ -6271,21 +6267,43 @@
                 </a:solidFill>
                 <a:latin typeface="Arial"/>
               </a:rPr>
-              <a:t>Mahmoud Murammish</a:t>
-            </a:r>
-          </a:p>
-        </p:txBody>
-      </p:sp>
-      <p:sp>
-        <p:nvSpPr>
-          <p:cNvPr id="47" name="Rectangle 46"/>
+              <a:t>Mohamed Abdul</a:t>
+            </a:r>
+          </a:p>
+          <a:p>
+            <a:pPr algn="ctr">
+              <a:lnSpc>
+                <a:spcPct val="90000"/>
+              </a:lnSpc>
+              <a:spcBef>
+                <a:spcPts val="0"/>
+              </a:spcBef>
+              <a:spcAft>
+                <a:spcPts val="0"/>
+              </a:spcAft>
+            </a:pPr>
+            <a:r>
+              <a:rPr sz="600">
+                <a:solidFill>
+                  <a:srgbClr val="000000"/>
+                </a:solidFill>
+                <a:latin typeface="Arial"/>
+              </a:rPr>
+              <a:t>Latheef</a:t>
+            </a:r>
+          </a:p>
+        </p:txBody>
+      </p:sp>
+      <p:sp>
+        <p:nvSpPr>
+          <p:cNvPr id="49" name="Rectangle 48"/>
           <p:cNvSpPr/>
           <p:nvPr/>
         </p:nvSpPr>
         <p:spPr>
           <a:xfrm>
-            <a:off x="3402939" y="4845832"/>
-            <a:ext cx="882243" cy="213786"/>
+            <a:off x="4411218" y="4418258"/>
+            <a:ext cx="882243" cy="256544"/>
           </a:xfrm>
           <a:prstGeom prst="rect">
             <a:avLst/>
@@ -6335,6 +6353,114 @@
                 </a:solidFill>
                 <a:latin typeface="Arial"/>
               </a:rPr>
+              <a:t>Senior Technical</a:t>
+            </a:r>
+          </a:p>
+          <a:p>
+            <a:pPr algn="ctr">
+              <a:lnSpc>
+                <a:spcPct val="90000"/>
+              </a:lnSpc>
+              <a:spcBef>
+                <a:spcPts val="0"/>
+              </a:spcBef>
+              <a:spcAft>
+                <a:spcPts val="0"/>
+              </a:spcAft>
+            </a:pPr>
+            <a:r>
+              <a:rPr sz="700">
+                <a:solidFill>
+                  <a:srgbClr val="000000"/>
+                </a:solidFill>
+                <a:latin typeface="Arial"/>
+              </a:rPr>
+              <a:t>Engineer</a:t>
+            </a:r>
+          </a:p>
+          <a:p>
+            <a:pPr algn="ctr">
+              <a:lnSpc>
+                <a:spcPct val="90000"/>
+              </a:lnSpc>
+              <a:spcBef>
+                <a:spcPts val="0"/>
+              </a:spcBef>
+              <a:spcAft>
+                <a:spcPts val="0"/>
+              </a:spcAft>
+            </a:pPr>
+            <a:r>
+              <a:rPr sz="600">
+                <a:solidFill>
+                  <a:srgbClr val="000000"/>
+                </a:solidFill>
+                <a:latin typeface="Arial"/>
+              </a:rPr>
+              <a:t>Mahmoud Murammish</a:t>
+            </a:r>
+          </a:p>
+        </p:txBody>
+      </p:sp>
+      <p:sp>
+        <p:nvSpPr>
+          <p:cNvPr id="50" name="Rectangle 49"/>
+          <p:cNvSpPr/>
+          <p:nvPr/>
+        </p:nvSpPr>
+        <p:spPr>
+          <a:xfrm>
+            <a:off x="3402939" y="4845832"/>
+            <a:ext cx="882243" cy="213786"/>
+          </a:xfrm>
+          <a:prstGeom prst="rect">
+            <a:avLst/>
+          </a:prstGeom>
+          <a:solidFill>
+            <a:srgbClr val="FFFFFF"/>
+          </a:solidFill>
+          <a:ln w="6350">
+            <a:solidFill>
+              <a:srgbClr val="000000"/>
+            </a:solidFill>
+          </a:ln>
+        </p:spPr>
+        <p:style>
+          <a:lnRef idx="1">
+            <a:schemeClr val="accent1"/>
+          </a:lnRef>
+          <a:fillRef idx="3">
+            <a:schemeClr val="accent1"/>
+          </a:fillRef>
+          <a:effectRef idx="2">
+            <a:schemeClr val="accent1"/>
+          </a:effectRef>
+          <a:fontRef idx="minor">
+            <a:schemeClr val="lt1"/>
+          </a:fontRef>
+        </p:style>
+        <p:txBody>
+          <a:bodyPr rtlCol="0" anchor="ctr" wrap="square" bIns="6350" tIns="6350" lIns="12700" rIns="12700"/>
+          <a:lstStyle/>
+          <a:p>
+            <a:pPr algn="ctr">
+              <a:lnSpc>
+                <a:spcPct val="90000"/>
+              </a:lnSpc>
+              <a:spcBef>
+                <a:spcPts val="0"/>
+              </a:spcBef>
+              <a:spcAft>
+                <a:spcPts val="0"/>
+              </a:spcAft>
+            </a:pPr>
+            <a:r>
+              <a:rPr sz="700">
+                <a:solidFill>
+                  <a:srgbClr val="000000"/>
+                </a:solidFill>
+                <a:latin typeface="Arial"/>
+              </a:rPr>
               <a:t>Technical Engineer</a:t>
             </a:r>
           </a:p>
@@ -6364,7 +6490,7 @@
       </p:sp>
       <p:sp>
         <p:nvSpPr>
-          <p:cNvPr id="48" name="Rectangle 47"/>
+          <p:cNvPr id="51" name="Rectangle 50"/>
           <p:cNvSpPr/>
           <p:nvPr/>
         </p:nvSpPr>
@@ -6450,7 +6576,7 @@
       </p:sp>
       <p:sp>
         <p:nvSpPr>
-          <p:cNvPr id="49" name="Rectangle 48"/>
+          <p:cNvPr id="52" name="Rectangle 51"/>
           <p:cNvSpPr/>
           <p:nvPr/>
         </p:nvSpPr>
@@ -6536,7 +6662,7 @@
       </p:sp>
       <p:sp>
         <p:nvSpPr>
-          <p:cNvPr id="50" name="Rectangle 49"/>
+          <p:cNvPr id="53" name="Rectangle 52"/>
           <p:cNvSpPr/>
           <p:nvPr/>
         </p:nvSpPr>
@@ -6622,7 +6748,7 @@
       </p:sp>
       <p:sp>
         <p:nvSpPr>
-          <p:cNvPr id="51" name="Rectangle 50"/>
+          <p:cNvPr id="54" name="Rectangle 53"/>
           <p:cNvSpPr/>
           <p:nvPr/>
         </p:nvSpPr>
@@ -6708,7 +6834,7 @@
       </p:sp>
       <p:sp>
         <p:nvSpPr>
-          <p:cNvPr id="52" name="Rectangle 51"/>
+          <p:cNvPr id="55" name="Rectangle 54"/>
           <p:cNvSpPr/>
           <p:nvPr/>
         </p:nvSpPr>
@@ -6794,7 +6920,7 @@
       </p:sp>
       <p:sp>
         <p:nvSpPr>
-          <p:cNvPr id="53" name="Rectangle 52"/>
+          <p:cNvPr id="56" name="Rectangle 55"/>
           <p:cNvSpPr/>
           <p:nvPr/>
         </p:nvSpPr>
@@ -6880,7 +7006,7 @@
       </p:sp>
       <p:sp>
         <p:nvSpPr>
-          <p:cNvPr id="54" name="Rectangle 53"/>
+          <p:cNvPr id="57" name="Rectangle 56"/>
           <p:cNvSpPr/>
           <p:nvPr/>
         </p:nvSpPr>
@@ -6964,111 +7090,6 @@
           </a:p>
         </p:txBody>
       </p:sp>
-      <p:cxnSp>
-        <p:nvCxnSpPr>
-          <p:cNvPr id="55" name="Connector 54"/>
-          <p:cNvCxnSpPr/>
-          <p:nvPr/>
-        </p:nvCxnSpPr>
-        <p:spPr>
-          <a:xfrm>
-            <a:off x="4663287" y="3278063"/>
-            <a:ext cx="0" cy="142524"/>
-          </a:xfrm>
-          <a:prstGeom prst="line">
-            <a:avLst/>
-          </a:prstGeom>
-          <a:ln w="6350">
-            <a:solidFill>
-              <a:srgbClr val="000000"/>
-            </a:solidFill>
-          </a:ln>
-        </p:spPr>
-        <p:style>
-          <a:lnRef idx="2">
-            <a:schemeClr val="accent1"/>
-          </a:lnRef>
-          <a:fillRef idx="0">
-            <a:schemeClr val="accent1"/>
-          </a:fillRef>
-          <a:effectRef idx="1">
-            <a:schemeClr val="accent1"/>
-          </a:effectRef>
-          <a:fontRef idx="minor">
-            <a:schemeClr val="tx1"/>
-          </a:fontRef>
-        </p:style>
-      </p:cxnSp>
-      <p:cxnSp>
-        <p:nvCxnSpPr>
-          <p:cNvPr id="56" name="Connector 55"/>
-          <p:cNvCxnSpPr/>
-          <p:nvPr/>
-        </p:nvCxnSpPr>
-        <p:spPr>
-          <a:xfrm>
-            <a:off x="3718026" y="3420587"/>
-            <a:ext cx="2268627" cy="0"/>
-          </a:xfrm>
-          <a:prstGeom prst="line">
-            <a:avLst/>
-          </a:prstGeom>
-          <a:ln w="6350">
-            <a:solidFill>
-              <a:srgbClr val="000000"/>
-            </a:solidFill>
-          </a:ln>
-        </p:spPr>
-        <p:style>
-          <a:lnRef idx="2">
-            <a:schemeClr val="accent1"/>
-          </a:lnRef>
-          <a:fillRef idx="0">
-            <a:schemeClr val="accent1"/>
-          </a:fillRef>
-          <a:effectRef idx="1">
-            <a:schemeClr val="accent1"/>
-          </a:effectRef>
-          <a:fontRef idx="minor">
-            <a:schemeClr val="tx1"/>
-          </a:fontRef>
-        </p:style>
-      </p:cxnSp>
-      <p:cxnSp>
-        <p:nvCxnSpPr>
-          <p:cNvPr id="57" name="Connector 56"/>
-          <p:cNvCxnSpPr/>
-          <p:nvPr/>
-        </p:nvCxnSpPr>
-        <p:spPr>
-          <a:xfrm>
-            <a:off x="3907078" y="3420587"/>
-            <a:ext cx="0" cy="142525"/>
-          </a:xfrm>
-          <a:prstGeom prst="line">
-            <a:avLst/>
-          </a:prstGeom>
-          <a:ln w="6350">
-            <a:solidFill>
-              <a:srgbClr val="000000"/>
-            </a:solidFill>
-          </a:ln>
-        </p:spPr>
-        <p:style>
-          <a:lnRef idx="2">
-            <a:schemeClr val="accent1"/>
-          </a:lnRef>
-          <a:fillRef idx="0">
-            <a:schemeClr val="accent1"/>
-          </a:fillRef>
-          <a:effectRef idx="1">
-            <a:schemeClr val="accent1"/>
-          </a:effectRef>
-          <a:fontRef idx="minor">
-            <a:schemeClr val="tx1"/>
-          </a:fontRef>
-        </p:style>
-      </p:cxnSp>
       <p:cxnSp>
         <p:nvCxnSpPr>
           <p:cNvPr id="58" name="Connector 57"/>
@@ -7077,8 +7098,8 @@
         </p:nvCxnSpPr>
         <p:spPr>
           <a:xfrm>
-            <a:off x="5041392" y="3420587"/>
-            <a:ext cx="0" cy="142525"/>
+            <a:off x="4663287" y="3278063"/>
+            <a:ext cx="0" cy="142524"/>
           </a:xfrm>
           <a:prstGeom prst="line">
             <a:avLst/>
@@ -7112,8 +7133,8 @@
         </p:nvCxnSpPr>
         <p:spPr>
           <a:xfrm>
-            <a:off x="4474235" y="3420587"/>
-            <a:ext cx="0" cy="570098"/>
+            <a:off x="3718026" y="3420587"/>
+            <a:ext cx="2268627" cy="0"/>
           </a:xfrm>
           <a:prstGeom prst="line">
             <a:avLst/>
@@ -7147,8 +7168,8 @@
         </p:nvCxnSpPr>
         <p:spPr>
           <a:xfrm>
-            <a:off x="5230444" y="3420587"/>
-            <a:ext cx="0" cy="570098"/>
+            <a:off x="3907078" y="3420587"/>
+            <a:ext cx="0" cy="142525"/>
           </a:xfrm>
           <a:prstGeom prst="line">
             <a:avLst/>
@@ -7182,8 +7203,8 @@
         </p:nvCxnSpPr>
         <p:spPr>
           <a:xfrm>
-            <a:off x="5986653" y="3420587"/>
-            <a:ext cx="0" cy="570098"/>
+            <a:off x="5041392" y="3420587"/>
+            <a:ext cx="0" cy="142525"/>
           </a:xfrm>
           <a:prstGeom prst="line">
             <a:avLst/>
@@ -7217,8 +7238,8 @@
         </p:nvCxnSpPr>
         <p:spPr>
           <a:xfrm>
-            <a:off x="3844061" y="3420587"/>
-            <a:ext cx="0" cy="997671"/>
+            <a:off x="4474235" y="3420587"/>
+            <a:ext cx="0" cy="570098"/>
           </a:xfrm>
           <a:prstGeom prst="line">
             <a:avLst/>
@@ -7252,8 +7273,8 @@
         </p:nvCxnSpPr>
         <p:spPr>
           <a:xfrm>
-            <a:off x="4852339" y="3420587"/>
-            <a:ext cx="0" cy="997671"/>
+            <a:off x="5230444" y="3420587"/>
+            <a:ext cx="0" cy="570098"/>
           </a:xfrm>
           <a:prstGeom prst="line">
             <a:avLst/>
@@ -7287,8 +7308,8 @@
         </p:nvCxnSpPr>
         <p:spPr>
           <a:xfrm>
-            <a:off x="3844061" y="3420587"/>
-            <a:ext cx="0" cy="1425245"/>
+            <a:off x="5986653" y="3420587"/>
+            <a:ext cx="0" cy="570098"/>
           </a:xfrm>
           <a:prstGeom prst="line">
             <a:avLst/>
@@ -7322,8 +7343,8 @@
         </p:nvCxnSpPr>
         <p:spPr>
           <a:xfrm>
-            <a:off x="4789322" y="3420587"/>
-            <a:ext cx="0" cy="1425245"/>
+            <a:off x="3844061" y="3420587"/>
+            <a:ext cx="0" cy="997671"/>
           </a:xfrm>
           <a:prstGeom prst="line">
             <a:avLst/>
@@ -7357,8 +7378,8 @@
         </p:nvCxnSpPr>
         <p:spPr>
           <a:xfrm>
-            <a:off x="4474235" y="3420587"/>
-            <a:ext cx="0" cy="1852818"/>
+            <a:off x="4852339" y="3420587"/>
+            <a:ext cx="0" cy="997671"/>
           </a:xfrm>
           <a:prstGeom prst="line">
             <a:avLst/>
@@ -7392,8 +7413,8 @@
         </p:nvCxnSpPr>
         <p:spPr>
           <a:xfrm>
-            <a:off x="5230444" y="3420587"/>
-            <a:ext cx="0" cy="1852818"/>
+            <a:off x="3844061" y="3420587"/>
+            <a:ext cx="0" cy="1425245"/>
           </a:xfrm>
           <a:prstGeom prst="line">
             <a:avLst/>
@@ -7427,8 +7448,8 @@
         </p:nvCxnSpPr>
         <p:spPr>
           <a:xfrm>
-            <a:off x="5986653" y="3420587"/>
-            <a:ext cx="0" cy="1852818"/>
+            <a:off x="4789322" y="3420587"/>
+            <a:ext cx="0" cy="1425245"/>
           </a:xfrm>
           <a:prstGeom prst="line">
             <a:avLst/>
@@ -7462,8 +7483,8 @@
         </p:nvCxnSpPr>
         <p:spPr>
           <a:xfrm>
-            <a:off x="3718026" y="3420587"/>
-            <a:ext cx="0" cy="2280392"/>
+            <a:off x="4474235" y="3420587"/>
+            <a:ext cx="0" cy="1852818"/>
           </a:xfrm>
           <a:prstGeom prst="line">
             <a:avLst/>
@@ -7497,8 +7518,8 @@
         </p:nvCxnSpPr>
         <p:spPr>
           <a:xfrm>
-            <a:off x="4474235" y="3420587"/>
-            <a:ext cx="0" cy="2280392"/>
+            <a:off x="5230444" y="3420587"/>
+            <a:ext cx="0" cy="1852818"/>
           </a:xfrm>
           <a:prstGeom prst="line">
             <a:avLst/>
@@ -7532,6 +7553,111 @@
         </p:nvCxnSpPr>
         <p:spPr>
           <a:xfrm>
+            <a:off x="5986653" y="3420587"/>
+            <a:ext cx="0" cy="1852818"/>
+          </a:xfrm>
+          <a:prstGeom prst="line">
+            <a:avLst/>
+          </a:prstGeom>
+          <a:ln w="6350">
+            <a:solidFill>
+              <a:srgbClr val="000000"/>
+            </a:solidFill>
+          </a:ln>
+        </p:spPr>
+        <p:style>
+          <a:lnRef idx="2">
+            <a:schemeClr val="accent1"/>
+          </a:lnRef>
+          <a:fillRef idx="0">
+            <a:schemeClr val="accent1"/>
+          </a:fillRef>
+          <a:effectRef idx="1">
+            <a:schemeClr val="accent1"/>
+          </a:effectRef>
+          <a:fontRef idx="minor">
+            <a:schemeClr val="tx1"/>
+          </a:fontRef>
+        </p:style>
+      </p:cxnSp>
+      <p:cxnSp>
+        <p:nvCxnSpPr>
+          <p:cNvPr id="72" name="Connector 71"/>
+          <p:cNvCxnSpPr/>
+          <p:nvPr/>
+        </p:nvCxnSpPr>
+        <p:spPr>
+          <a:xfrm>
+            <a:off x="3718026" y="3420587"/>
+            <a:ext cx="0" cy="2280392"/>
+          </a:xfrm>
+          <a:prstGeom prst="line">
+            <a:avLst/>
+          </a:prstGeom>
+          <a:ln w="6350">
+            <a:solidFill>
+              <a:srgbClr val="000000"/>
+            </a:solidFill>
+          </a:ln>
+        </p:spPr>
+        <p:style>
+          <a:lnRef idx="2">
+            <a:schemeClr val="accent1"/>
+          </a:lnRef>
+          <a:fillRef idx="0">
+            <a:schemeClr val="accent1"/>
+          </a:fillRef>
+          <a:effectRef idx="1">
+            <a:schemeClr val="accent1"/>
+          </a:effectRef>
+          <a:fontRef idx="minor">
+            <a:schemeClr val="tx1"/>
+          </a:fontRef>
+        </p:style>
+      </p:cxnSp>
+      <p:cxnSp>
+        <p:nvCxnSpPr>
+          <p:cNvPr id="73" name="Connector 72"/>
+          <p:cNvCxnSpPr/>
+          <p:nvPr/>
+        </p:nvCxnSpPr>
+        <p:spPr>
+          <a:xfrm>
+            <a:off x="4474235" y="3420587"/>
+            <a:ext cx="0" cy="2280392"/>
+          </a:xfrm>
+          <a:prstGeom prst="line">
+            <a:avLst/>
+          </a:prstGeom>
+          <a:ln w="6350">
+            <a:solidFill>
+              <a:srgbClr val="000000"/>
+            </a:solidFill>
+          </a:ln>
+        </p:spPr>
+        <p:style>
+          <a:lnRef idx="2">
+            <a:schemeClr val="accent1"/>
+          </a:lnRef>
+          <a:fillRef idx="0">
+            <a:schemeClr val="accent1"/>
+          </a:fillRef>
+          <a:effectRef idx="1">
+            <a:schemeClr val="accent1"/>
+          </a:effectRef>
+          <a:fontRef idx="minor">
+            <a:schemeClr val="tx1"/>
+          </a:fontRef>
+        </p:style>
+      </p:cxnSp>
+      <p:cxnSp>
+        <p:nvCxnSpPr>
+          <p:cNvPr id="74" name="Connector 73"/>
+          <p:cNvCxnSpPr/>
+          <p:nvPr/>
+        </p:nvCxnSpPr>
+        <p:spPr>
+          <a:xfrm>
             <a:off x="5230444" y="3420587"/>
             <a:ext cx="0" cy="2280392"/>
           </a:xfrm>
@@ -7561,14 +7687,14 @@
       </p:cxnSp>
       <p:sp>
         <p:nvSpPr>
-          <p:cNvPr id="72" name="Rectangle 71"/>
+          <p:cNvPr id="75" name="Rectangle 74"/>
           <p:cNvSpPr/>
           <p:nvPr/>
         </p:nvSpPr>
         <p:spPr>
           <a:xfrm>
             <a:off x="6553809" y="2993014"/>
-            <a:ext cx="1260348" cy="285048"/>
+            <a:ext cx="1260348" cy="142524"/>
           </a:xfrm>
           <a:prstGeom prst="rect">
             <a:avLst/>
@@ -7621,40 +7747,18 @@
               <a:t>Sound (SME*)</a:t>
             </a:r>
           </a:p>
-          <a:p>
-            <a:pPr algn="ctr">
-              <a:lnSpc>
-                <a:spcPct val="90000"/>
-              </a:lnSpc>
-              <a:spcBef>
-                <a:spcPts val="0"/>
-              </a:spcBef>
-              <a:spcAft>
-                <a:spcPts val="0"/>
-              </a:spcAft>
-            </a:pPr>
-            <a:r>
-              <a:rPr sz="800">
-                <a:solidFill>
-                  <a:srgbClr val="000000"/>
-                </a:solidFill>
-                <a:latin typeface="Arial"/>
-              </a:rPr>
-              <a:t>Khalid Hassan Said</a:t>
-            </a:r>
-          </a:p>
-        </p:txBody>
-      </p:sp>
-      <p:sp>
-        <p:nvSpPr>
-          <p:cNvPr id="73" name="Rectangle 72"/>
+        </p:txBody>
+      </p:sp>
+      <p:sp>
+        <p:nvSpPr>
+          <p:cNvPr id="76" name="Rectangle 75"/>
           <p:cNvSpPr/>
           <p:nvPr/>
         </p:nvSpPr>
         <p:spPr>
           <a:xfrm>
-            <a:off x="6049670" y="3563112"/>
-            <a:ext cx="1008278" cy="256544"/>
+            <a:off x="6553809" y="3135538"/>
+            <a:ext cx="1260348" cy="142524"/>
           </a:xfrm>
           <a:prstGeom prst="rect">
             <a:avLst/>
@@ -7698,70 +7802,26 @@
               </a:spcAft>
             </a:pPr>
             <a:r>
-              <a:rPr sz="700">
-                <a:solidFill>
-                  <a:srgbClr val="000000"/>
-                </a:solidFill>
-                <a:latin typeface="Arial"/>
-              </a:rPr>
-              <a:t>Senior Network</a:t>
-            </a:r>
-          </a:p>
-          <a:p>
-            <a:pPr algn="ctr">
-              <a:lnSpc>
-                <a:spcPct val="90000"/>
-              </a:lnSpc>
-              <a:spcBef>
-                <a:spcPts val="0"/>
-              </a:spcBef>
-              <a:spcAft>
-                <a:spcPts val="0"/>
-              </a:spcAft>
-            </a:pPr>
-            <a:r>
-              <a:rPr sz="700">
-                <a:solidFill>
-                  <a:srgbClr val="000000"/>
-                </a:solidFill>
-                <a:latin typeface="Arial"/>
-              </a:rPr>
-              <a:t>Architecht</a:t>
-            </a:r>
-          </a:p>
-          <a:p>
-            <a:pPr algn="ctr">
-              <a:lnSpc>
-                <a:spcPct val="90000"/>
-              </a:lnSpc>
-              <a:spcBef>
-                <a:spcPts val="0"/>
-              </a:spcBef>
-              <a:spcAft>
-                <a:spcPts val="0"/>
-              </a:spcAft>
-            </a:pPr>
-            <a:r>
-              <a:rPr sz="700">
-                <a:solidFill>
-                  <a:srgbClr val="000000"/>
-                </a:solidFill>
-                <a:latin typeface="Arial"/>
-              </a:rPr>
-              <a:t>Faisal Ilyas</a:t>
-            </a:r>
-          </a:p>
-        </p:txBody>
-      </p:sp>
-      <p:sp>
-        <p:nvSpPr>
-          <p:cNvPr id="74" name="Rectangle 73"/>
+              <a:rPr sz="800">
+                <a:solidFill>
+                  <a:srgbClr val="000000"/>
+                </a:solidFill>
+                <a:latin typeface="Arial"/>
+              </a:rPr>
+              <a:t>Khalid Hassan Said</a:t>
+            </a:r>
+          </a:p>
+        </p:txBody>
+      </p:sp>
+      <p:sp>
+        <p:nvSpPr>
+          <p:cNvPr id="77" name="Rectangle 76"/>
           <p:cNvSpPr/>
           <p:nvPr/>
         </p:nvSpPr>
         <p:spPr>
           <a:xfrm>
-            <a:off x="7183983" y="3563112"/>
+            <a:off x="6049670" y="3563112"/>
             <a:ext cx="1008278" cy="256544"/>
           </a:xfrm>
           <a:prstGeom prst="rect">
@@ -7812,7 +7872,7 @@
                 </a:solidFill>
                 <a:latin typeface="Arial"/>
               </a:rPr>
-              <a:t>Senior Audio</a:t>
+              <a:t>Senior Network</a:t>
             </a:r>
           </a:p>
           <a:p>
@@ -7834,42 +7894,42 @@
                 </a:solidFill>
                 <a:latin typeface="Arial"/>
               </a:rPr>
-              <a:t>Engineer</a:t>
-            </a:r>
-          </a:p>
-          <a:p>
-            <a:pPr algn="ctr">
-              <a:lnSpc>
-                <a:spcPct val="90000"/>
-              </a:lnSpc>
-              <a:spcBef>
-                <a:spcPts val="0"/>
-              </a:spcBef>
-              <a:spcAft>
-                <a:spcPts val="0"/>
-              </a:spcAft>
-            </a:pPr>
-            <a:r>
-              <a:rPr sz="600">
-                <a:solidFill>
-                  <a:srgbClr val="000000"/>
-                </a:solidFill>
-                <a:latin typeface="Arial"/>
-              </a:rPr>
-              <a:t>Ramy Abdul Fattah</a:t>
-            </a:r>
-          </a:p>
-        </p:txBody>
-      </p:sp>
-      <p:sp>
-        <p:nvSpPr>
-          <p:cNvPr id="75" name="Rectangle 74"/>
+              <a:t>Architecht</a:t>
+            </a:r>
+          </a:p>
+          <a:p>
+            <a:pPr algn="ctr">
+              <a:lnSpc>
+                <a:spcPct val="90000"/>
+              </a:lnSpc>
+              <a:spcBef>
+                <a:spcPts val="0"/>
+              </a:spcBef>
+              <a:spcAft>
+                <a:spcPts val="0"/>
+              </a:spcAft>
+            </a:pPr>
+            <a:r>
+              <a:rPr sz="700">
+                <a:solidFill>
+                  <a:srgbClr val="000000"/>
+                </a:solidFill>
+                <a:latin typeface="Arial"/>
+              </a:rPr>
+              <a:t>Faisal Ilyas</a:t>
+            </a:r>
+          </a:p>
+        </p:txBody>
+      </p:sp>
+      <p:sp>
+        <p:nvSpPr>
+          <p:cNvPr id="78" name="Rectangle 77"/>
           <p:cNvSpPr/>
           <p:nvPr/>
         </p:nvSpPr>
         <p:spPr>
           <a:xfrm>
-            <a:off x="6049670" y="3990685"/>
+            <a:off x="7183983" y="3563112"/>
             <a:ext cx="1008278" cy="256544"/>
           </a:xfrm>
           <a:prstGeom prst="rect">
@@ -7964,20 +8024,20 @@
                 </a:solidFill>
                 <a:latin typeface="Arial"/>
               </a:rPr>
-              <a:t>Alaa Abdul Jawwad</a:t>
-            </a:r>
-          </a:p>
-        </p:txBody>
-      </p:sp>
-      <p:sp>
-        <p:nvSpPr>
-          <p:cNvPr id="76" name="Rectangle 75"/>
+              <a:t>Ramy Abdul Fattah</a:t>
+            </a:r>
+          </a:p>
+        </p:txBody>
+      </p:sp>
+      <p:sp>
+        <p:nvSpPr>
+          <p:cNvPr id="79" name="Rectangle 78"/>
           <p:cNvSpPr/>
           <p:nvPr/>
         </p:nvSpPr>
         <p:spPr>
           <a:xfrm>
-            <a:off x="7183983" y="3990685"/>
+            <a:off x="6049670" y="3990685"/>
             <a:ext cx="1008278" cy="256544"/>
           </a:xfrm>
           <a:prstGeom prst="rect">
@@ -8028,6 +8088,114 @@
                 </a:solidFill>
                 <a:latin typeface="Arial"/>
               </a:rPr>
+              <a:t>Senior Audio</a:t>
+            </a:r>
+          </a:p>
+          <a:p>
+            <a:pPr algn="ctr">
+              <a:lnSpc>
+                <a:spcPct val="90000"/>
+              </a:lnSpc>
+              <a:spcBef>
+                <a:spcPts val="0"/>
+              </a:spcBef>
+              <a:spcAft>
+                <a:spcPts val="0"/>
+              </a:spcAft>
+            </a:pPr>
+            <a:r>
+              <a:rPr sz="700">
+                <a:solidFill>
+                  <a:srgbClr val="000000"/>
+                </a:solidFill>
+                <a:latin typeface="Arial"/>
+              </a:rPr>
+              <a:t>Engineer</a:t>
+            </a:r>
+          </a:p>
+          <a:p>
+            <a:pPr algn="ctr">
+              <a:lnSpc>
+                <a:spcPct val="90000"/>
+              </a:lnSpc>
+              <a:spcBef>
+                <a:spcPts val="0"/>
+              </a:spcBef>
+              <a:spcAft>
+                <a:spcPts val="0"/>
+              </a:spcAft>
+            </a:pPr>
+            <a:r>
+              <a:rPr sz="600">
+                <a:solidFill>
+                  <a:srgbClr val="000000"/>
+                </a:solidFill>
+                <a:latin typeface="Arial"/>
+              </a:rPr>
+              <a:t>Alaa Abdul Jawwad</a:t>
+            </a:r>
+          </a:p>
+        </p:txBody>
+      </p:sp>
+      <p:sp>
+        <p:nvSpPr>
+          <p:cNvPr id="80" name="Rectangle 79"/>
+          <p:cNvSpPr/>
+          <p:nvPr/>
+        </p:nvSpPr>
+        <p:spPr>
+          <a:xfrm>
+            <a:off x="7183983" y="3990685"/>
+            <a:ext cx="1008278" cy="256544"/>
+          </a:xfrm>
+          <a:prstGeom prst="rect">
+            <a:avLst/>
+          </a:prstGeom>
+          <a:solidFill>
+            <a:srgbClr val="FFFFFF"/>
+          </a:solidFill>
+          <a:ln w="6350">
+            <a:solidFill>
+              <a:srgbClr val="000000"/>
+            </a:solidFill>
+          </a:ln>
+        </p:spPr>
+        <p:style>
+          <a:lnRef idx="1">
+            <a:schemeClr val="accent1"/>
+          </a:lnRef>
+          <a:fillRef idx="3">
+            <a:schemeClr val="accent1"/>
+          </a:fillRef>
+          <a:effectRef idx="2">
+            <a:schemeClr val="accent1"/>
+          </a:effectRef>
+          <a:fontRef idx="minor">
+            <a:schemeClr val="lt1"/>
+          </a:fontRef>
+        </p:style>
+        <p:txBody>
+          <a:bodyPr rtlCol="0" anchor="ctr" wrap="square" bIns="6350" tIns="6350" lIns="12700" rIns="12700"/>
+          <a:lstStyle/>
+          <a:p>
+            <a:pPr algn="ctr">
+              <a:lnSpc>
+                <a:spcPct val="90000"/>
+              </a:lnSpc>
+              <a:spcBef>
+                <a:spcPts val="0"/>
+              </a:spcBef>
+              <a:spcAft>
+                <a:spcPts val="0"/>
+              </a:spcAft>
+            </a:pPr>
+            <a:r>
+              <a:rPr sz="700">
+                <a:solidFill>
+                  <a:srgbClr val="000000"/>
+                </a:solidFill>
+                <a:latin typeface="Arial"/>
+              </a:rPr>
               <a:t>QA &amp; QC Inspector</a:t>
             </a:r>
           </a:p>
@@ -8057,7 +8225,7 @@
       </p:sp>
       <p:sp>
         <p:nvSpPr>
-          <p:cNvPr id="77" name="Rectangle 76"/>
+          <p:cNvPr id="81" name="Rectangle 80"/>
           <p:cNvSpPr/>
           <p:nvPr/>
         </p:nvSpPr>
@@ -8121,7 +8289,7 @@
       </p:sp>
       <p:sp>
         <p:nvSpPr>
-          <p:cNvPr id="78" name="Rectangle 77"/>
+          <p:cNvPr id="82" name="Rectangle 81"/>
           <p:cNvSpPr/>
           <p:nvPr/>
         </p:nvSpPr>
@@ -8207,7 +8375,7 @@
       </p:sp>
       <p:sp>
         <p:nvSpPr>
-          <p:cNvPr id="79" name="Rectangle 78"/>
+          <p:cNvPr id="83" name="Rectangle 82"/>
           <p:cNvSpPr/>
           <p:nvPr/>
         </p:nvSpPr>
@@ -8293,7 +8461,7 @@
       </p:sp>
       <p:sp>
         <p:nvSpPr>
-          <p:cNvPr id="80" name="Rectangle 79"/>
+          <p:cNvPr id="84" name="Rectangle 83"/>
           <p:cNvSpPr/>
           <p:nvPr/>
         </p:nvSpPr>
@@ -8401,7 +8569,7 @@
       </p:sp>
       <p:sp>
         <p:nvSpPr>
-          <p:cNvPr id="81" name="Rectangle 80"/>
+          <p:cNvPr id="85" name="Rectangle 84"/>
           <p:cNvSpPr/>
           <p:nvPr/>
         </p:nvSpPr>
@@ -8485,146 +8653,6 @@
           </a:p>
         </p:txBody>
       </p:sp>
-      <p:cxnSp>
-        <p:nvCxnSpPr>
-          <p:cNvPr id="82" name="Connector 81"/>
-          <p:cNvCxnSpPr/>
-          <p:nvPr/>
-        </p:nvCxnSpPr>
-        <p:spPr>
-          <a:xfrm>
-            <a:off x="7183983" y="3278063"/>
-            <a:ext cx="0" cy="142524"/>
-          </a:xfrm>
-          <a:prstGeom prst="line">
-            <a:avLst/>
-          </a:prstGeom>
-          <a:ln w="6350">
-            <a:solidFill>
-              <a:srgbClr val="000000"/>
-            </a:solidFill>
-          </a:ln>
-        </p:spPr>
-        <p:style>
-          <a:lnRef idx="2">
-            <a:schemeClr val="accent1"/>
-          </a:lnRef>
-          <a:fillRef idx="0">
-            <a:schemeClr val="accent1"/>
-          </a:fillRef>
-          <a:effectRef idx="1">
-            <a:schemeClr val="accent1"/>
-          </a:effectRef>
-          <a:fontRef idx="minor">
-            <a:schemeClr val="tx1"/>
-          </a:fontRef>
-        </p:style>
-      </p:cxnSp>
-      <p:cxnSp>
-        <p:nvCxnSpPr>
-          <p:cNvPr id="83" name="Connector 82"/>
-          <p:cNvCxnSpPr/>
-          <p:nvPr/>
-        </p:nvCxnSpPr>
-        <p:spPr>
-          <a:xfrm>
-            <a:off x="6364757" y="3420587"/>
-            <a:ext cx="1323365" cy="0"/>
-          </a:xfrm>
-          <a:prstGeom prst="line">
-            <a:avLst/>
-          </a:prstGeom>
-          <a:ln w="6350">
-            <a:solidFill>
-              <a:srgbClr val="000000"/>
-            </a:solidFill>
-          </a:ln>
-        </p:spPr>
-        <p:style>
-          <a:lnRef idx="2">
-            <a:schemeClr val="accent1"/>
-          </a:lnRef>
-          <a:fillRef idx="0">
-            <a:schemeClr val="accent1"/>
-          </a:fillRef>
-          <a:effectRef idx="1">
-            <a:schemeClr val="accent1"/>
-          </a:effectRef>
-          <a:fontRef idx="minor">
-            <a:schemeClr val="tx1"/>
-          </a:fontRef>
-        </p:style>
-      </p:cxnSp>
-      <p:cxnSp>
-        <p:nvCxnSpPr>
-          <p:cNvPr id="84" name="Connector 83"/>
-          <p:cNvCxnSpPr/>
-          <p:nvPr/>
-        </p:nvCxnSpPr>
-        <p:spPr>
-          <a:xfrm>
-            <a:off x="6553809" y="3420587"/>
-            <a:ext cx="0" cy="142525"/>
-          </a:xfrm>
-          <a:prstGeom prst="line">
-            <a:avLst/>
-          </a:prstGeom>
-          <a:ln w="6350">
-            <a:solidFill>
-              <a:srgbClr val="000000"/>
-            </a:solidFill>
-          </a:ln>
-        </p:spPr>
-        <p:style>
-          <a:lnRef idx="2">
-            <a:schemeClr val="accent1"/>
-          </a:lnRef>
-          <a:fillRef idx="0">
-            <a:schemeClr val="accent1"/>
-          </a:fillRef>
-          <a:effectRef idx="1">
-            <a:schemeClr val="accent1"/>
-          </a:effectRef>
-          <a:fontRef idx="minor">
-            <a:schemeClr val="tx1"/>
-          </a:fontRef>
-        </p:style>
-      </p:cxnSp>
-      <p:cxnSp>
-        <p:nvCxnSpPr>
-          <p:cNvPr id="85" name="Connector 84"/>
-          <p:cNvCxnSpPr/>
-          <p:nvPr/>
-        </p:nvCxnSpPr>
-        <p:spPr>
-          <a:xfrm>
-            <a:off x="7688122" y="3420587"/>
-            <a:ext cx="0" cy="142525"/>
-          </a:xfrm>
-          <a:prstGeom prst="line">
-            <a:avLst/>
-          </a:prstGeom>
-          <a:ln w="6350">
-            <a:solidFill>
-              <a:srgbClr val="000000"/>
-            </a:solidFill>
-          </a:ln>
-        </p:spPr>
-        <p:style>
-          <a:lnRef idx="2">
-            <a:schemeClr val="accent1"/>
-          </a:lnRef>
-          <a:fillRef idx="0">
-            <a:schemeClr val="accent1"/>
-          </a:fillRef>
-          <a:effectRef idx="1">
-            <a:schemeClr val="accent1"/>
-          </a:effectRef>
-          <a:fontRef idx="minor">
-            <a:schemeClr val="tx1"/>
-          </a:fontRef>
-        </p:style>
-      </p:cxnSp>
       <p:cxnSp>
         <p:nvCxnSpPr>
           <p:cNvPr id="86" name="Connector 85"/>
@@ -8633,8 +8661,8 @@
         </p:nvCxnSpPr>
         <p:spPr>
           <a:xfrm>
-            <a:off x="6553809" y="3420587"/>
-            <a:ext cx="0" cy="570098"/>
+            <a:off x="7183983" y="3278063"/>
+            <a:ext cx="0" cy="142524"/>
           </a:xfrm>
           <a:prstGeom prst="line">
             <a:avLst/>
@@ -8668,8 +8696,8 @@
         </p:nvCxnSpPr>
         <p:spPr>
           <a:xfrm>
-            <a:off x="7688122" y="3420587"/>
-            <a:ext cx="0" cy="570098"/>
+            <a:off x="6364757" y="3420587"/>
+            <a:ext cx="1323365" cy="0"/>
           </a:xfrm>
           <a:prstGeom prst="line">
             <a:avLst/>
@@ -8703,8 +8731,8 @@
         </p:nvCxnSpPr>
         <p:spPr>
           <a:xfrm>
-            <a:off x="6931914" y="3420587"/>
-            <a:ext cx="0" cy="997671"/>
+            <a:off x="6553809" y="3420587"/>
+            <a:ext cx="0" cy="142525"/>
           </a:xfrm>
           <a:prstGeom prst="line">
             <a:avLst/>
@@ -8738,8 +8766,8 @@
         </p:nvCxnSpPr>
         <p:spPr>
           <a:xfrm>
-            <a:off x="6616827" y="3420587"/>
-            <a:ext cx="0" cy="1425245"/>
+            <a:off x="7688122" y="3420587"/>
+            <a:ext cx="0" cy="142525"/>
           </a:xfrm>
           <a:prstGeom prst="line">
             <a:avLst/>
@@ -8773,8 +8801,8 @@
         </p:nvCxnSpPr>
         <p:spPr>
           <a:xfrm>
-            <a:off x="7373035" y="3420587"/>
-            <a:ext cx="0" cy="1425245"/>
+            <a:off x="6553809" y="3420587"/>
+            <a:ext cx="0" cy="570098"/>
           </a:xfrm>
           <a:prstGeom prst="line">
             <a:avLst/>
@@ -8808,8 +8836,8 @@
         </p:nvCxnSpPr>
         <p:spPr>
           <a:xfrm>
-            <a:off x="6364757" y="3420587"/>
-            <a:ext cx="0" cy="1852818"/>
+            <a:off x="7688122" y="3420587"/>
+            <a:ext cx="0" cy="570098"/>
           </a:xfrm>
           <a:prstGeom prst="line">
             <a:avLst/>
@@ -8843,6 +8871,146 @@
         </p:nvCxnSpPr>
         <p:spPr>
           <a:xfrm>
+            <a:off x="6931914" y="3420587"/>
+            <a:ext cx="0" cy="997671"/>
+          </a:xfrm>
+          <a:prstGeom prst="line">
+            <a:avLst/>
+          </a:prstGeom>
+          <a:ln w="6350">
+            <a:solidFill>
+              <a:srgbClr val="000000"/>
+            </a:solidFill>
+          </a:ln>
+        </p:spPr>
+        <p:style>
+          <a:lnRef idx="2">
+            <a:schemeClr val="accent1"/>
+          </a:lnRef>
+          <a:fillRef idx="0">
+            <a:schemeClr val="accent1"/>
+          </a:fillRef>
+          <a:effectRef idx="1">
+            <a:schemeClr val="accent1"/>
+          </a:effectRef>
+          <a:fontRef idx="minor">
+            <a:schemeClr val="tx1"/>
+          </a:fontRef>
+        </p:style>
+      </p:cxnSp>
+      <p:cxnSp>
+        <p:nvCxnSpPr>
+          <p:cNvPr id="93" name="Connector 92"/>
+          <p:cNvCxnSpPr/>
+          <p:nvPr/>
+        </p:nvCxnSpPr>
+        <p:spPr>
+          <a:xfrm>
+            <a:off x="6616827" y="3420587"/>
+            <a:ext cx="0" cy="1425245"/>
+          </a:xfrm>
+          <a:prstGeom prst="line">
+            <a:avLst/>
+          </a:prstGeom>
+          <a:ln w="6350">
+            <a:solidFill>
+              <a:srgbClr val="000000"/>
+            </a:solidFill>
+          </a:ln>
+        </p:spPr>
+        <p:style>
+          <a:lnRef idx="2">
+            <a:schemeClr val="accent1"/>
+          </a:lnRef>
+          <a:fillRef idx="0">
+            <a:schemeClr val="accent1"/>
+          </a:fillRef>
+          <a:effectRef idx="1">
+            <a:schemeClr val="accent1"/>
+          </a:effectRef>
+          <a:fontRef idx="minor">
+            <a:schemeClr val="tx1"/>
+          </a:fontRef>
+        </p:style>
+      </p:cxnSp>
+      <p:cxnSp>
+        <p:nvCxnSpPr>
+          <p:cNvPr id="94" name="Connector 93"/>
+          <p:cNvCxnSpPr/>
+          <p:nvPr/>
+        </p:nvCxnSpPr>
+        <p:spPr>
+          <a:xfrm>
+            <a:off x="7373035" y="3420587"/>
+            <a:ext cx="0" cy="1425245"/>
+          </a:xfrm>
+          <a:prstGeom prst="line">
+            <a:avLst/>
+          </a:prstGeom>
+          <a:ln w="6350">
+            <a:solidFill>
+              <a:srgbClr val="000000"/>
+            </a:solidFill>
+          </a:ln>
+        </p:spPr>
+        <p:style>
+          <a:lnRef idx="2">
+            <a:schemeClr val="accent1"/>
+          </a:lnRef>
+          <a:fillRef idx="0">
+            <a:schemeClr val="accent1"/>
+          </a:fillRef>
+          <a:effectRef idx="1">
+            <a:schemeClr val="accent1"/>
+          </a:effectRef>
+          <a:fontRef idx="minor">
+            <a:schemeClr val="tx1"/>
+          </a:fontRef>
+        </p:style>
+      </p:cxnSp>
+      <p:cxnSp>
+        <p:nvCxnSpPr>
+          <p:cNvPr id="95" name="Connector 94"/>
+          <p:cNvCxnSpPr/>
+          <p:nvPr/>
+        </p:nvCxnSpPr>
+        <p:spPr>
+          <a:xfrm>
+            <a:off x="6364757" y="3420587"/>
+            <a:ext cx="0" cy="1852818"/>
+          </a:xfrm>
+          <a:prstGeom prst="line">
+            <a:avLst/>
+          </a:prstGeom>
+          <a:ln w="6350">
+            <a:solidFill>
+              <a:srgbClr val="000000"/>
+            </a:solidFill>
+          </a:ln>
+        </p:spPr>
+        <p:style>
+          <a:lnRef idx="2">
+            <a:schemeClr val="accent1"/>
+          </a:lnRef>
+          <a:fillRef idx="0">
+            <a:schemeClr val="accent1"/>
+          </a:fillRef>
+          <a:effectRef idx="1">
+            <a:schemeClr val="accent1"/>
+          </a:effectRef>
+          <a:fontRef idx="minor">
+            <a:schemeClr val="tx1"/>
+          </a:fontRef>
+        </p:style>
+      </p:cxnSp>
+      <p:cxnSp>
+        <p:nvCxnSpPr>
+          <p:cNvPr id="96" name="Connector 95"/>
+          <p:cNvCxnSpPr/>
+          <p:nvPr/>
+        </p:nvCxnSpPr>
+        <p:spPr>
+          <a:xfrm>
             <a:off x="7120966" y="3420587"/>
             <a:ext cx="0" cy="1852818"/>
           </a:xfrm>
@@ -8872,7 +9040,7 @@
       </p:cxnSp>
       <p:sp>
         <p:nvSpPr>
-          <p:cNvPr id="93" name="Rectangle 92"/>
+          <p:cNvPr id="97" name="Rectangle 96"/>
           <p:cNvSpPr/>
           <p:nvPr/>
         </p:nvSpPr>
@@ -8958,7 +9126,7 @@
       </p:sp>
       <p:sp>
         <p:nvSpPr>
-          <p:cNvPr id="94" name="Rectangle 93"/>
+          <p:cNvPr id="98" name="Rectangle 97"/>
           <p:cNvSpPr/>
           <p:nvPr/>
         </p:nvSpPr>
@@ -9044,7 +9212,7 @@
       </p:sp>
       <p:sp>
         <p:nvSpPr>
-          <p:cNvPr id="95" name="Rectangle 94"/>
+          <p:cNvPr id="99" name="Rectangle 98"/>
           <p:cNvSpPr/>
           <p:nvPr/>
         </p:nvSpPr>
@@ -9130,7 +9298,7 @@
       </p:sp>
       <p:sp>
         <p:nvSpPr>
-          <p:cNvPr id="96" name="Rectangle 95"/>
+          <p:cNvPr id="100" name="Rectangle 99"/>
           <p:cNvSpPr/>
           <p:nvPr/>
         </p:nvSpPr>
@@ -9229,7 +9397,7 @@
       </p:sp>
       <p:sp>
         <p:nvSpPr>
-          <p:cNvPr id="97" name="Rectangle 96"/>
+          <p:cNvPr id="101" name="Rectangle 100"/>
           <p:cNvSpPr/>
           <p:nvPr/>
         </p:nvSpPr>
@@ -9337,7 +9505,7 @@
       </p:sp>
       <p:sp>
         <p:nvSpPr>
-          <p:cNvPr id="98" name="Rectangle 97"/>
+          <p:cNvPr id="102" name="Rectangle 101"/>
           <p:cNvSpPr/>
           <p:nvPr/>
         </p:nvSpPr>
@@ -9445,7 +9613,7 @@
       </p:sp>
       <p:sp>
         <p:nvSpPr>
-          <p:cNvPr id="99" name="Rectangle 98"/>
+          <p:cNvPr id="103" name="Rectangle 102"/>
           <p:cNvSpPr/>
           <p:nvPr/>
         </p:nvSpPr>
@@ -9531,7 +9699,7 @@
       </p:sp>
       <p:sp>
         <p:nvSpPr>
-          <p:cNvPr id="100" name="Rectangle 99"/>
+          <p:cNvPr id="104" name="Rectangle 103"/>
           <p:cNvSpPr/>
           <p:nvPr/>
         </p:nvSpPr>
@@ -9617,7 +9785,7 @@
       </p:sp>
       <p:sp>
         <p:nvSpPr>
-          <p:cNvPr id="101" name="Rectangle 100"/>
+          <p:cNvPr id="105" name="Rectangle 104"/>
           <p:cNvSpPr/>
           <p:nvPr/>
         </p:nvSpPr>
@@ -9703,7 +9871,7 @@
       </p:sp>
       <p:sp>
         <p:nvSpPr>
-          <p:cNvPr id="102" name="Rectangle 101"/>
+          <p:cNvPr id="106" name="Rectangle 105"/>
           <p:cNvSpPr/>
           <p:nvPr/>
         </p:nvSpPr>
@@ -9811,7 +9979,7 @@
       </p:sp>
       <p:sp>
         <p:nvSpPr>
-          <p:cNvPr id="103" name="Rectangle 102"/>
+          <p:cNvPr id="107" name="Rectangle 106"/>
           <p:cNvSpPr/>
           <p:nvPr/>
         </p:nvSpPr>
@@ -9878,146 +10046,6 @@
           </a:p>
         </p:txBody>
       </p:sp>
-      <p:cxnSp>
-        <p:nvCxnSpPr>
-          <p:cNvPr id="104" name="Connector 103"/>
-          <p:cNvCxnSpPr/>
-          <p:nvPr/>
-        </p:nvCxnSpPr>
-        <p:spPr>
-          <a:xfrm>
-            <a:off x="5986653" y="1140195"/>
-            <a:ext cx="0" cy="142525"/>
-          </a:xfrm>
-          <a:prstGeom prst="line">
-            <a:avLst/>
-          </a:prstGeom>
-          <a:ln w="6350">
-            <a:solidFill>
-              <a:srgbClr val="000000"/>
-            </a:solidFill>
-          </a:ln>
-        </p:spPr>
-        <p:style>
-          <a:lnRef idx="2">
-            <a:schemeClr val="accent1"/>
-          </a:lnRef>
-          <a:fillRef idx="0">
-            <a:schemeClr val="accent1"/>
-          </a:fillRef>
-          <a:effectRef idx="1">
-            <a:schemeClr val="accent1"/>
-          </a:effectRef>
-          <a:fontRef idx="minor">
-            <a:schemeClr val="tx1"/>
-          </a:fontRef>
-        </p:style>
-      </p:cxnSp>
-      <p:cxnSp>
-        <p:nvCxnSpPr>
-          <p:cNvPr id="105" name="Connector 104"/>
-          <p:cNvCxnSpPr/>
-          <p:nvPr/>
-        </p:nvCxnSpPr>
-        <p:spPr>
-          <a:xfrm>
-            <a:off x="4411218" y="1282720"/>
-            <a:ext cx="2016556" cy="0"/>
-          </a:xfrm>
-          <a:prstGeom prst="line">
-            <a:avLst/>
-          </a:prstGeom>
-          <a:ln w="6350">
-            <a:solidFill>
-              <a:srgbClr val="000000"/>
-            </a:solidFill>
-          </a:ln>
-        </p:spPr>
-        <p:style>
-          <a:lnRef idx="2">
-            <a:schemeClr val="accent1"/>
-          </a:lnRef>
-          <a:fillRef idx="0">
-            <a:schemeClr val="accent1"/>
-          </a:fillRef>
-          <a:effectRef idx="1">
-            <a:schemeClr val="accent1"/>
-          </a:effectRef>
-          <a:fontRef idx="minor">
-            <a:schemeClr val="tx1"/>
-          </a:fontRef>
-        </p:style>
-      </p:cxnSp>
-      <p:cxnSp>
-        <p:nvCxnSpPr>
-          <p:cNvPr id="106" name="Connector 105"/>
-          <p:cNvCxnSpPr/>
-          <p:nvPr/>
-        </p:nvCxnSpPr>
-        <p:spPr>
-          <a:xfrm>
-            <a:off x="4411218" y="1282720"/>
-            <a:ext cx="0" cy="142524"/>
-          </a:xfrm>
-          <a:prstGeom prst="line">
-            <a:avLst/>
-          </a:prstGeom>
-          <a:ln w="6350">
-            <a:solidFill>
-              <a:srgbClr val="000000"/>
-            </a:solidFill>
-          </a:ln>
-        </p:spPr>
-        <p:style>
-          <a:lnRef idx="2">
-            <a:schemeClr val="accent1"/>
-          </a:lnRef>
-          <a:fillRef idx="0">
-            <a:schemeClr val="accent1"/>
-          </a:fillRef>
-          <a:effectRef idx="1">
-            <a:schemeClr val="accent1"/>
-          </a:effectRef>
-          <a:fontRef idx="minor">
-            <a:schemeClr val="tx1"/>
-          </a:fontRef>
-        </p:style>
-      </p:cxnSp>
-      <p:cxnSp>
-        <p:nvCxnSpPr>
-          <p:cNvPr id="107" name="Connector 106"/>
-          <p:cNvCxnSpPr/>
-          <p:nvPr/>
-        </p:nvCxnSpPr>
-        <p:spPr>
-          <a:xfrm>
-            <a:off x="6427774" y="1282720"/>
-            <a:ext cx="0" cy="142524"/>
-          </a:xfrm>
-          <a:prstGeom prst="line">
-            <a:avLst/>
-          </a:prstGeom>
-          <a:ln w="6350">
-            <a:solidFill>
-              <a:srgbClr val="000000"/>
-            </a:solidFill>
-          </a:ln>
-        </p:spPr>
-        <p:style>
-          <a:lnRef idx="2">
-            <a:schemeClr val="accent1"/>
-          </a:lnRef>
-          <a:fillRef idx="0">
-            <a:schemeClr val="accent1"/>
-          </a:fillRef>
-          <a:effectRef idx="1">
-            <a:schemeClr val="accent1"/>
-          </a:effectRef>
-          <a:fontRef idx="minor">
-            <a:schemeClr val="tx1"/>
-          </a:fontRef>
-        </p:style>
-      </p:cxnSp>
       <p:cxnSp>
         <p:nvCxnSpPr>
           <p:cNvPr id="108" name="Connector 107"/>
@@ -10026,8 +10054,8 @@
         </p:nvCxnSpPr>
         <p:spPr>
           <a:xfrm>
-            <a:off x="6427774" y="1852818"/>
-            <a:ext cx="0" cy="142524"/>
+            <a:off x="5986653" y="1140195"/>
+            <a:ext cx="0" cy="142525"/>
           </a:xfrm>
           <a:prstGeom prst="line">
             <a:avLst/>
@@ -10061,8 +10089,8 @@
         </p:nvCxnSpPr>
         <p:spPr>
           <a:xfrm>
-            <a:off x="5545531" y="1995342"/>
-            <a:ext cx="2520696" cy="0"/>
+            <a:off x="4411218" y="1282720"/>
+            <a:ext cx="2016556" cy="0"/>
           </a:xfrm>
           <a:prstGeom prst="line">
             <a:avLst/>
@@ -10096,8 +10124,8 @@
         </p:nvCxnSpPr>
         <p:spPr>
           <a:xfrm>
-            <a:off x="5545531" y="1995342"/>
-            <a:ext cx="0" cy="142525"/>
+            <a:off x="4411218" y="1282720"/>
+            <a:ext cx="0" cy="142524"/>
           </a:xfrm>
           <a:prstGeom prst="line">
             <a:avLst/>
@@ -10131,8 +10159,8 @@
         </p:nvCxnSpPr>
         <p:spPr>
           <a:xfrm>
-            <a:off x="6805879" y="1995342"/>
-            <a:ext cx="0" cy="142525"/>
+            <a:off x="6427774" y="1282720"/>
+            <a:ext cx="0" cy="142524"/>
           </a:xfrm>
           <a:prstGeom prst="line">
             <a:avLst/>
@@ -10166,8 +10194,8 @@
         </p:nvCxnSpPr>
         <p:spPr>
           <a:xfrm>
-            <a:off x="8066227" y="1995342"/>
-            <a:ext cx="0" cy="142525"/>
+            <a:off x="6427774" y="1852818"/>
+            <a:ext cx="0" cy="142524"/>
           </a:xfrm>
           <a:prstGeom prst="line">
             <a:avLst/>
@@ -10201,6 +10229,146 @@
         </p:nvCxnSpPr>
         <p:spPr>
           <a:xfrm>
+            <a:off x="5545531" y="1995342"/>
+            <a:ext cx="2520696" cy="0"/>
+          </a:xfrm>
+          <a:prstGeom prst="line">
+            <a:avLst/>
+          </a:prstGeom>
+          <a:ln w="6350">
+            <a:solidFill>
+              <a:srgbClr val="000000"/>
+            </a:solidFill>
+          </a:ln>
+        </p:spPr>
+        <p:style>
+          <a:lnRef idx="2">
+            <a:schemeClr val="accent1"/>
+          </a:lnRef>
+          <a:fillRef idx="0">
+            <a:schemeClr val="accent1"/>
+          </a:fillRef>
+          <a:effectRef idx="1">
+            <a:schemeClr val="accent1"/>
+          </a:effectRef>
+          <a:fontRef idx="minor">
+            <a:schemeClr val="tx1"/>
+          </a:fontRef>
+        </p:style>
+      </p:cxnSp>
+      <p:cxnSp>
+        <p:nvCxnSpPr>
+          <p:cNvPr id="114" name="Connector 113"/>
+          <p:cNvCxnSpPr/>
+          <p:nvPr/>
+        </p:nvCxnSpPr>
+        <p:spPr>
+          <a:xfrm>
+            <a:off x="5545531" y="1995342"/>
+            <a:ext cx="0" cy="142525"/>
+          </a:xfrm>
+          <a:prstGeom prst="line">
+            <a:avLst/>
+          </a:prstGeom>
+          <a:ln w="6350">
+            <a:solidFill>
+              <a:srgbClr val="000000"/>
+            </a:solidFill>
+          </a:ln>
+        </p:spPr>
+        <p:style>
+          <a:lnRef idx="2">
+            <a:schemeClr val="accent1"/>
+          </a:lnRef>
+          <a:fillRef idx="0">
+            <a:schemeClr val="accent1"/>
+          </a:fillRef>
+          <a:effectRef idx="1">
+            <a:schemeClr val="accent1"/>
+          </a:effectRef>
+          <a:fontRef idx="minor">
+            <a:schemeClr val="tx1"/>
+          </a:fontRef>
+        </p:style>
+      </p:cxnSp>
+      <p:cxnSp>
+        <p:nvCxnSpPr>
+          <p:cNvPr id="115" name="Connector 114"/>
+          <p:cNvCxnSpPr/>
+          <p:nvPr/>
+        </p:nvCxnSpPr>
+        <p:spPr>
+          <a:xfrm>
+            <a:off x="6805879" y="1995342"/>
+            <a:ext cx="0" cy="142525"/>
+          </a:xfrm>
+          <a:prstGeom prst="line">
+            <a:avLst/>
+          </a:prstGeom>
+          <a:ln w="6350">
+            <a:solidFill>
+              <a:srgbClr val="000000"/>
+            </a:solidFill>
+          </a:ln>
+        </p:spPr>
+        <p:style>
+          <a:lnRef idx="2">
+            <a:schemeClr val="accent1"/>
+          </a:lnRef>
+          <a:fillRef idx="0">
+            <a:schemeClr val="accent1"/>
+          </a:fillRef>
+          <a:effectRef idx="1">
+            <a:schemeClr val="accent1"/>
+          </a:effectRef>
+          <a:fontRef idx="minor">
+            <a:schemeClr val="tx1"/>
+          </a:fontRef>
+        </p:style>
+      </p:cxnSp>
+      <p:cxnSp>
+        <p:nvCxnSpPr>
+          <p:cNvPr id="116" name="Connector 115"/>
+          <p:cNvCxnSpPr/>
+          <p:nvPr/>
+        </p:nvCxnSpPr>
+        <p:spPr>
+          <a:xfrm>
+            <a:off x="8066227" y="1995342"/>
+            <a:ext cx="0" cy="142525"/>
+          </a:xfrm>
+          <a:prstGeom prst="line">
+            <a:avLst/>
+          </a:prstGeom>
+          <a:ln w="6350">
+            <a:solidFill>
+              <a:srgbClr val="000000"/>
+            </a:solidFill>
+          </a:ln>
+        </p:spPr>
+        <p:style>
+          <a:lnRef idx="2">
+            <a:schemeClr val="accent1"/>
+          </a:lnRef>
+          <a:fillRef idx="0">
+            <a:schemeClr val="accent1"/>
+          </a:fillRef>
+          <a:effectRef idx="1">
+            <a:schemeClr val="accent1"/>
+          </a:effectRef>
+          <a:fontRef idx="minor">
+            <a:schemeClr val="tx1"/>
+          </a:fontRef>
+        </p:style>
+      </p:cxnSp>
+      <p:cxnSp>
+        <p:nvCxnSpPr>
+          <p:cNvPr id="117" name="Connector 116"/>
+          <p:cNvCxnSpPr/>
+          <p:nvPr/>
+        </p:nvCxnSpPr>
+        <p:spPr>
+          <a:xfrm>
             <a:off x="6175705" y="1995342"/>
             <a:ext cx="0" cy="712623"/>
           </a:xfrm>
@@ -10230,7 +10398,7 @@
       </p:cxnSp>
       <p:sp>
         <p:nvSpPr>
-          <p:cNvPr id="114" name="TextBox 113"/>
+          <p:cNvPr id="118" name="TextBox 117"/>
           <p:cNvSpPr txBox="1"/>
           <p:nvPr/>
         </p:nvSpPr>

</xml_diff>